<commit_message>
- Atualização das janelas do programa.
</commit_message>
<xml_diff>
--- a/Documentação/Manual do Usuário/janelas.pptx
+++ b/Documentação/Manual do Usuário/janelas.pptx
@@ -193,7 +193,8 @@
           <a:p>
             <a:fld id="{96B7E667-CCE7-4EBE-9BC2-3D4686A3281A}" type="datetimeFigureOut">
               <a:rPr lang="pt-BR" smtClean="0"/>
-              <a:t>17/05/2009</a:t>
+              <a:pPr/>
+              <a:t>19/05/2009</a:t>
             </a:fld>
             <a:endParaRPr lang="pt-BR"/>
           </a:p>
@@ -354,6 +355,7 @@
           <a:p>
             <a:fld id="{0B357942-8123-4276-B24C-D10FFA08FD83}" type="slidenum">
               <a:rPr lang="pt-BR" smtClean="0"/>
+              <a:pPr/>
               <a:t>‹nº›</a:t>
             </a:fld>
             <a:endParaRPr lang="pt-BR"/>
@@ -525,6 +527,7 @@
           <a:p>
             <a:fld id="{0B357942-8123-4276-B24C-D10FFA08FD83}" type="slidenum">
               <a:rPr lang="pt-BR" smtClean="0"/>
+              <a:pPr/>
               <a:t>1</a:t>
             </a:fld>
             <a:endParaRPr lang="pt-BR"/>
@@ -606,6 +609,7 @@
           <a:p>
             <a:fld id="{0B357942-8123-4276-B24C-D10FFA08FD83}" type="slidenum">
               <a:rPr lang="pt-BR" smtClean="0"/>
+              <a:pPr/>
               <a:t>2</a:t>
             </a:fld>
             <a:endParaRPr lang="pt-BR"/>
@@ -801,7 +805,8 @@
           <a:p>
             <a:fld id="{963319C4-A51E-4246-83F7-260429D40A10}" type="datetimeFigureOut">
               <a:rPr lang="pt-BR" smtClean="0"/>
-              <a:t>17/05/2009</a:t>
+              <a:pPr/>
+              <a:t>19/05/2009</a:t>
             </a:fld>
             <a:endParaRPr lang="pt-BR"/>
           </a:p>
@@ -843,6 +848,7 @@
           <a:p>
             <a:fld id="{0EE4935E-1027-4BD4-BFF4-93CC211E89CC}" type="slidenum">
               <a:rPr lang="pt-BR" smtClean="0"/>
+              <a:pPr/>
               <a:t>‹nº›</a:t>
             </a:fld>
             <a:endParaRPr lang="pt-BR"/>
@@ -966,7 +972,8 @@
           <a:p>
             <a:fld id="{963319C4-A51E-4246-83F7-260429D40A10}" type="datetimeFigureOut">
               <a:rPr lang="pt-BR" smtClean="0"/>
-              <a:t>17/05/2009</a:t>
+              <a:pPr/>
+              <a:t>19/05/2009</a:t>
             </a:fld>
             <a:endParaRPr lang="pt-BR"/>
           </a:p>
@@ -1008,6 +1015,7 @@
           <a:p>
             <a:fld id="{0EE4935E-1027-4BD4-BFF4-93CC211E89CC}" type="slidenum">
               <a:rPr lang="pt-BR" smtClean="0"/>
+              <a:pPr/>
               <a:t>‹nº›</a:t>
             </a:fld>
             <a:endParaRPr lang="pt-BR"/>
@@ -1141,7 +1149,8 @@
           <a:p>
             <a:fld id="{963319C4-A51E-4246-83F7-260429D40A10}" type="datetimeFigureOut">
               <a:rPr lang="pt-BR" smtClean="0"/>
-              <a:t>17/05/2009</a:t>
+              <a:pPr/>
+              <a:t>19/05/2009</a:t>
             </a:fld>
             <a:endParaRPr lang="pt-BR"/>
           </a:p>
@@ -1183,6 +1192,7 @@
           <a:p>
             <a:fld id="{0EE4935E-1027-4BD4-BFF4-93CC211E89CC}" type="slidenum">
               <a:rPr lang="pt-BR" smtClean="0"/>
+              <a:pPr/>
               <a:t>‹nº›</a:t>
             </a:fld>
             <a:endParaRPr lang="pt-BR"/>
@@ -1306,7 +1316,8 @@
           <a:p>
             <a:fld id="{963319C4-A51E-4246-83F7-260429D40A10}" type="datetimeFigureOut">
               <a:rPr lang="pt-BR" smtClean="0"/>
-              <a:t>17/05/2009</a:t>
+              <a:pPr/>
+              <a:t>19/05/2009</a:t>
             </a:fld>
             <a:endParaRPr lang="pt-BR"/>
           </a:p>
@@ -1348,6 +1359,7 @@
           <a:p>
             <a:fld id="{0EE4935E-1027-4BD4-BFF4-93CC211E89CC}" type="slidenum">
               <a:rPr lang="pt-BR" smtClean="0"/>
+              <a:pPr/>
               <a:t>‹nº›</a:t>
             </a:fld>
             <a:endParaRPr lang="pt-BR"/>
@@ -1547,7 +1559,8 @@
           <a:p>
             <a:fld id="{963319C4-A51E-4246-83F7-260429D40A10}" type="datetimeFigureOut">
               <a:rPr lang="pt-BR" smtClean="0"/>
-              <a:t>17/05/2009</a:t>
+              <a:pPr/>
+              <a:t>19/05/2009</a:t>
             </a:fld>
             <a:endParaRPr lang="pt-BR"/>
           </a:p>
@@ -1589,6 +1602,7 @@
           <a:p>
             <a:fld id="{0EE4935E-1027-4BD4-BFF4-93CC211E89CC}" type="slidenum">
               <a:rPr lang="pt-BR" smtClean="0"/>
+              <a:pPr/>
               <a:t>‹nº›</a:t>
             </a:fld>
             <a:endParaRPr lang="pt-BR"/>
@@ -1830,7 +1844,8 @@
           <a:p>
             <a:fld id="{963319C4-A51E-4246-83F7-260429D40A10}" type="datetimeFigureOut">
               <a:rPr lang="pt-BR" smtClean="0"/>
-              <a:t>17/05/2009</a:t>
+              <a:pPr/>
+              <a:t>19/05/2009</a:t>
             </a:fld>
             <a:endParaRPr lang="pt-BR"/>
           </a:p>
@@ -1872,6 +1887,7 @@
           <a:p>
             <a:fld id="{0EE4935E-1027-4BD4-BFF4-93CC211E89CC}" type="slidenum">
               <a:rPr lang="pt-BR" smtClean="0"/>
+              <a:pPr/>
               <a:t>‹nº›</a:t>
             </a:fld>
             <a:endParaRPr lang="pt-BR"/>
@@ -2247,7 +2263,8 @@
           <a:p>
             <a:fld id="{963319C4-A51E-4246-83F7-260429D40A10}" type="datetimeFigureOut">
               <a:rPr lang="pt-BR" smtClean="0"/>
-              <a:t>17/05/2009</a:t>
+              <a:pPr/>
+              <a:t>19/05/2009</a:t>
             </a:fld>
             <a:endParaRPr lang="pt-BR"/>
           </a:p>
@@ -2289,6 +2306,7 @@
           <a:p>
             <a:fld id="{0EE4935E-1027-4BD4-BFF4-93CC211E89CC}" type="slidenum">
               <a:rPr lang="pt-BR" smtClean="0"/>
+              <a:pPr/>
               <a:t>‹nº›</a:t>
             </a:fld>
             <a:endParaRPr lang="pt-BR"/>
@@ -2360,7 +2378,8 @@
           <a:p>
             <a:fld id="{963319C4-A51E-4246-83F7-260429D40A10}" type="datetimeFigureOut">
               <a:rPr lang="pt-BR" smtClean="0"/>
-              <a:t>17/05/2009</a:t>
+              <a:pPr/>
+              <a:t>19/05/2009</a:t>
             </a:fld>
             <a:endParaRPr lang="pt-BR"/>
           </a:p>
@@ -2402,6 +2421,7 @@
           <a:p>
             <a:fld id="{0EE4935E-1027-4BD4-BFF4-93CC211E89CC}" type="slidenum">
               <a:rPr lang="pt-BR" smtClean="0"/>
+              <a:pPr/>
               <a:t>‹nº›</a:t>
             </a:fld>
             <a:endParaRPr lang="pt-BR"/>
@@ -2450,7 +2470,8 @@
           <a:p>
             <a:fld id="{963319C4-A51E-4246-83F7-260429D40A10}" type="datetimeFigureOut">
               <a:rPr lang="pt-BR" smtClean="0"/>
-              <a:t>17/05/2009</a:t>
+              <a:pPr/>
+              <a:t>19/05/2009</a:t>
             </a:fld>
             <a:endParaRPr lang="pt-BR"/>
           </a:p>
@@ -2492,6 +2513,7 @@
           <a:p>
             <a:fld id="{0EE4935E-1027-4BD4-BFF4-93CC211E89CC}" type="slidenum">
               <a:rPr lang="pt-BR" smtClean="0"/>
+              <a:pPr/>
               <a:t>‹nº›</a:t>
             </a:fld>
             <a:endParaRPr lang="pt-BR"/>
@@ -2722,7 +2744,8 @@
           <a:p>
             <a:fld id="{963319C4-A51E-4246-83F7-260429D40A10}" type="datetimeFigureOut">
               <a:rPr lang="pt-BR" smtClean="0"/>
-              <a:t>17/05/2009</a:t>
+              <a:pPr/>
+              <a:t>19/05/2009</a:t>
             </a:fld>
             <a:endParaRPr lang="pt-BR"/>
           </a:p>
@@ -2764,6 +2787,7 @@
           <a:p>
             <a:fld id="{0EE4935E-1027-4BD4-BFF4-93CC211E89CC}" type="slidenum">
               <a:rPr lang="pt-BR" smtClean="0"/>
+              <a:pPr/>
               <a:t>‹nº›</a:t>
             </a:fld>
             <a:endParaRPr lang="pt-BR"/>
@@ -2970,7 +2994,8 @@
           <a:p>
             <a:fld id="{963319C4-A51E-4246-83F7-260429D40A10}" type="datetimeFigureOut">
               <a:rPr lang="pt-BR" smtClean="0"/>
-              <a:t>17/05/2009</a:t>
+              <a:pPr/>
+              <a:t>19/05/2009</a:t>
             </a:fld>
             <a:endParaRPr lang="pt-BR"/>
           </a:p>
@@ -3012,6 +3037,7 @@
           <a:p>
             <a:fld id="{0EE4935E-1027-4BD4-BFF4-93CC211E89CC}" type="slidenum">
               <a:rPr lang="pt-BR" smtClean="0"/>
+              <a:pPr/>
               <a:t>‹nº›</a:t>
             </a:fld>
             <a:endParaRPr lang="pt-BR"/>
@@ -3178,7 +3204,8 @@
           <a:p>
             <a:fld id="{963319C4-A51E-4246-83F7-260429D40A10}" type="datetimeFigureOut">
               <a:rPr lang="pt-BR" smtClean="0"/>
-              <a:t>17/05/2009</a:t>
+              <a:pPr/>
+              <a:t>19/05/2009</a:t>
             </a:fld>
             <a:endParaRPr lang="pt-BR"/>
           </a:p>
@@ -3256,6 +3283,7 @@
           <a:p>
             <a:fld id="{0EE4935E-1027-4BD4-BFF4-93CC211E89CC}" type="slidenum">
               <a:rPr lang="pt-BR" smtClean="0"/>
+              <a:pPr/>
               <a:t>‹nº›</a:t>
             </a:fld>
             <a:endParaRPr lang="pt-BR"/>
@@ -3556,10 +3584,10 @@
         </p:nvGrpSpPr>
         <p:grpSpPr>
           <a:xfrm>
-            <a:off x="285720" y="857232"/>
-            <a:ext cx="8501121" cy="4990095"/>
-            <a:chOff x="285720" y="857232"/>
-            <a:chExt cx="8501121" cy="4990095"/>
+            <a:off x="285720" y="818595"/>
+            <a:ext cx="8501121" cy="5067369"/>
+            <a:chOff x="285720" y="818595"/>
+            <a:chExt cx="8501121" cy="5067369"/>
           </a:xfrm>
         </p:grpSpPr>
         <p:grpSp>
@@ -3570,10 +3598,10 @@
           </p:nvGrpSpPr>
           <p:grpSpPr>
             <a:xfrm>
-              <a:off x="285720" y="857232"/>
-              <a:ext cx="6500858" cy="4990095"/>
-              <a:chOff x="714348" y="785794"/>
-              <a:chExt cx="7715304" cy="5922311"/>
+              <a:off x="285720" y="818595"/>
+              <a:ext cx="6500858" cy="5067369"/>
+              <a:chOff x="714348" y="739939"/>
+              <a:chExt cx="7715304" cy="6014021"/>
             </a:xfrm>
           </p:grpSpPr>
           <p:grpSp>
@@ -3584,10 +3612,10 @@
             </p:nvGrpSpPr>
             <p:grpSpPr>
               <a:xfrm>
-                <a:off x="714348" y="785794"/>
-                <a:ext cx="7715304" cy="5922311"/>
-                <a:chOff x="714348" y="785794"/>
-                <a:chExt cx="7715304" cy="5922311"/>
+                <a:off x="714348" y="739939"/>
+                <a:ext cx="7715304" cy="6014021"/>
+                <a:chOff x="714348" y="739939"/>
+                <a:chExt cx="7715304" cy="6014021"/>
               </a:xfrm>
             </p:grpSpPr>
             <p:sp>
@@ -3598,7 +3626,7 @@
               </p:nvSpPr>
               <p:spPr>
                 <a:xfrm>
-                  <a:off x="714348" y="6279477"/>
+                  <a:off x="714348" y="6325332"/>
                   <a:ext cx="7715304" cy="428628"/>
                 </a:xfrm>
                 <a:prstGeom prst="roundRect">
@@ -3661,10 +3689,10 @@
               </p:nvGrpSpPr>
               <p:grpSpPr>
                 <a:xfrm>
-                  <a:off x="714348" y="785794"/>
-                  <a:ext cx="7715304" cy="5572164"/>
-                  <a:chOff x="714348" y="785794"/>
-                  <a:chExt cx="7715304" cy="5572164"/>
+                  <a:off x="714348" y="739939"/>
+                  <a:ext cx="7715304" cy="5618019"/>
+                  <a:chOff x="714348" y="739939"/>
+                  <a:chExt cx="7715304" cy="5618019"/>
                 </a:xfrm>
               </p:grpSpPr>
               <p:sp>
@@ -3675,7 +3703,7 @@
                 </p:nvSpPr>
                 <p:spPr>
                   <a:xfrm>
-                    <a:off x="714348" y="785794"/>
+                    <a:off x="714348" y="739939"/>
                     <a:ext cx="7715304" cy="428628"/>
                   </a:xfrm>
                   <a:prstGeom prst="roundRect">
@@ -3843,7 +3871,7 @@
                     </a:r>
                     <a:r>
                       <a:rPr lang="pt-BR" sz="1400" dirty="0" smtClean="0"/>
-                      <a:t>ile        </a:t>
+                      <a:t>ile      </a:t>
                     </a:r>
                     <a:r>
                       <a:rPr lang="pt-BR" sz="1400" u="sng" dirty="0" smtClean="0"/>
@@ -3851,7 +3879,7 @@
                     </a:r>
                     <a:r>
                       <a:rPr lang="pt-BR" sz="1400" dirty="0" smtClean="0"/>
-                      <a:t>dit        </a:t>
+                      <a:t>dit      </a:t>
                     </a:r>
                     <a:r>
                       <a:rPr lang="pt-BR" sz="1400" u="sng" dirty="0" err="1" smtClean="0"/>
@@ -3863,7 +3891,23 @@
                     </a:r>
                     <a:r>
                       <a:rPr lang="pt-BR" sz="1400" dirty="0" smtClean="0"/>
-                      <a:t>        </a:t>
+                      <a:t>      </a:t>
+                    </a:r>
+                    <a:r>
+                      <a:rPr lang="pt-BR" sz="1400" u="sng" dirty="0" err="1" smtClean="0"/>
+                      <a:t>R</a:t>
+                    </a:r>
+                    <a:r>
+                      <a:rPr lang="pt-BR" sz="1400" dirty="0" err="1" smtClean="0"/>
+                      <a:t>eports</a:t>
+                    </a:r>
+                    <a:r>
+                      <a:rPr lang="pt-BR" sz="1400" dirty="0" smtClean="0"/>
+                      <a:t> </a:t>
+                    </a:r>
+                    <a:r>
+                      <a:rPr lang="pt-BR" sz="1400" dirty="0" smtClean="0"/>
+                      <a:t>     </a:t>
                     </a:r>
                     <a:r>
                       <a:rPr lang="pt-BR" sz="1400" u="sng" dirty="0" smtClean="0"/>
@@ -4022,7 +4066,7 @@
             </p:pic>
             <p:pic>
               <p:nvPicPr>
-                <p:cNvPr id="22" name="Imagem 21" descr="Button Refresh.png"/>
+                <p:cNvPr id="23" name="Imagem 22" descr="Button Stop.png"/>
                 <p:cNvPicPr>
                   <a:picLocks noChangeAspect="1"/>
                 </p:cNvPicPr>
@@ -4030,30 +4074,6 @@
               </p:nvPicPr>
               <p:blipFill>
                 <a:blip r:embed="rId7"/>
-                <a:stretch>
-                  <a:fillRect/>
-                </a:stretch>
-              </p:blipFill>
-              <p:spPr>
-                <a:xfrm>
-                  <a:off x="4049611" y="1637541"/>
-                  <a:ext cx="381087" cy="381087"/>
-                </a:xfrm>
-                <a:prstGeom prst="rect">
-                  <a:avLst/>
-                </a:prstGeom>
-              </p:spPr>
-            </p:pic>
-            <p:pic>
-              <p:nvPicPr>
-                <p:cNvPr id="23" name="Imagem 22" descr="Button Stop.png"/>
-                <p:cNvPicPr>
-                  <a:picLocks noChangeAspect="1"/>
-                </p:cNvPicPr>
-                <p:nvPr/>
-              </p:nvPicPr>
-              <p:blipFill>
-                <a:blip r:embed="rId8"/>
                 <a:stretch>
                   <a:fillRect/>
                 </a:stretch>
@@ -4077,7 +4097,7 @@
                 <p:nvPr/>
               </p:nvPicPr>
               <p:blipFill>
-                <a:blip r:embed="rId9"/>
+                <a:blip r:embed="rId8"/>
                 <a:stretch>
                   <a:fillRect/>
                 </a:stretch>
@@ -4101,14 +4121,14 @@
                 <p:nvPr/>
               </p:nvPicPr>
               <p:blipFill>
-                <a:blip r:embed="rId10"/>
+                <a:blip r:embed="rId9"/>
                 <a:stretch>
                   <a:fillRect/>
                 </a:stretch>
               </p:blipFill>
               <p:spPr>
                 <a:xfrm>
-                  <a:off x="4541271" y="1637541"/>
+                  <a:off x="4020907" y="1637541"/>
                   <a:ext cx="381087" cy="381087"/>
                 </a:xfrm>
                 <a:prstGeom prst="rect">
@@ -4125,7 +4145,7 @@
                 <p:nvPr/>
               </p:nvPicPr>
               <p:blipFill>
-                <a:blip r:embed="rId11"/>
+                <a:blip r:embed="rId10"/>
                 <a:stretch>
                   <a:fillRect/>
                 </a:stretch>
@@ -4149,15 +4169,15 @@
                 <p:nvPr/>
               </p:nvPicPr>
               <p:blipFill>
-                <a:blip r:embed="rId12"/>
+                <a:blip r:embed="rId11"/>
                 <a:stretch>
                   <a:fillRect/>
                 </a:stretch>
               </p:blipFill>
               <p:spPr>
                 <a:xfrm>
-                  <a:off x="5429256" y="1685208"/>
-                  <a:ext cx="285752" cy="285752"/>
+                  <a:off x="4868742" y="1685209"/>
+                  <a:ext cx="285753" cy="285753"/>
                 </a:xfrm>
                 <a:prstGeom prst="rect">
                   <a:avLst/>
@@ -4173,14 +4193,14 @@
                 <p:nvPr/>
               </p:nvPicPr>
               <p:blipFill>
-                <a:blip r:embed="rId13"/>
+                <a:blip r:embed="rId12"/>
                 <a:stretch>
                   <a:fillRect/>
                 </a:stretch>
               </p:blipFill>
               <p:spPr>
                 <a:xfrm>
-                  <a:off x="5032931" y="1685209"/>
+                  <a:off x="4529608" y="1685209"/>
                   <a:ext cx="285750" cy="285750"/>
                 </a:xfrm>
                 <a:prstGeom prst="rect">
@@ -4482,370 +4502,16 @@
       </p:grpSpPr>
       <p:grpSp>
         <p:nvGrpSpPr>
-          <p:cNvPr id="35" name="Grupo 34"/>
-          <p:cNvGrpSpPr/>
-          <p:nvPr/>
-        </p:nvGrpSpPr>
-        <p:grpSpPr>
-          <a:xfrm>
-            <a:off x="497346" y="714357"/>
-            <a:ext cx="3135769" cy="1591557"/>
-            <a:chOff x="640222" y="642919"/>
-            <a:chExt cx="3135769" cy="1591557"/>
-          </a:xfrm>
-        </p:grpSpPr>
-        <p:grpSp>
-          <p:nvGrpSpPr>
-            <p:cNvPr id="32" name="Grupo 31"/>
-            <p:cNvGrpSpPr/>
-            <p:nvPr/>
-          </p:nvGrpSpPr>
-          <p:grpSpPr>
-            <a:xfrm>
-              <a:off x="640222" y="642919"/>
-              <a:ext cx="3135769" cy="1591557"/>
-              <a:chOff x="640221" y="642918"/>
-              <a:chExt cx="3135769" cy="1665550"/>
-            </a:xfrm>
-          </p:grpSpPr>
-          <p:sp>
-            <p:nvSpPr>
-              <p:cNvPr id="13" name="Retângulo de cantos arredondados 12"/>
-              <p:cNvSpPr/>
-              <p:nvPr/>
-            </p:nvSpPr>
-            <p:spPr>
-              <a:xfrm>
-                <a:off x="642909" y="2160641"/>
-                <a:ext cx="3133081" cy="147827"/>
-              </a:xfrm>
-              <a:prstGeom prst="roundRect">
-                <a:avLst/>
-              </a:prstGeom>
-              <a:solidFill>
-                <a:schemeClr val="accent1">
-                  <a:lumMod val="20000"/>
-                  <a:lumOff val="80000"/>
-                </a:schemeClr>
-              </a:solidFill>
-              <a:ln>
-                <a:solidFill>
-                  <a:schemeClr val="accent5">
-                    <a:lumMod val="60000"/>
-                    <a:lumOff val="40000"/>
-                  </a:schemeClr>
-                </a:solidFill>
-              </a:ln>
-            </p:spPr>
-            <p:style>
-              <a:lnRef idx="2">
-                <a:schemeClr val="accent5"/>
-              </a:lnRef>
-              <a:fillRef idx="1">
-                <a:schemeClr val="lt1"/>
-              </a:fillRef>
-              <a:effectRef idx="0">
-                <a:schemeClr val="accent5"/>
-              </a:effectRef>
-              <a:fontRef idx="minor">
-                <a:schemeClr val="dk1"/>
-              </a:fontRef>
-            </p:style>
-            <p:txBody>
-              <a:bodyPr rtlCol="0" anchor="ctr"/>
-              <a:lstStyle/>
-              <a:p>
-                <a:endParaRPr lang="pt-BR" sz="1400" dirty="0">
-                  <a:solidFill>
-                    <a:schemeClr val="tx1"/>
-                  </a:solidFill>
-                </a:endParaRPr>
-              </a:p>
-            </p:txBody>
-          </p:sp>
-          <p:sp>
-            <p:nvSpPr>
-              <p:cNvPr id="26" name="Retângulo de cantos arredondados 25"/>
-              <p:cNvSpPr/>
-              <p:nvPr/>
-            </p:nvSpPr>
-            <p:spPr>
-              <a:xfrm>
-                <a:off x="642909" y="642918"/>
-                <a:ext cx="3133081" cy="448555"/>
-              </a:xfrm>
-              <a:prstGeom prst="roundRect">
-                <a:avLst/>
-              </a:prstGeom>
-              <a:solidFill>
-                <a:schemeClr val="accent1">
-                  <a:lumMod val="20000"/>
-                  <a:lumOff val="80000"/>
-                </a:schemeClr>
-              </a:solidFill>
-              <a:ln>
-                <a:solidFill>
-                  <a:schemeClr val="accent5">
-                    <a:lumMod val="60000"/>
-                    <a:lumOff val="40000"/>
-                  </a:schemeClr>
-                </a:solidFill>
-              </a:ln>
-            </p:spPr>
-            <p:style>
-              <a:lnRef idx="2">
-                <a:schemeClr val="accent5"/>
-              </a:lnRef>
-              <a:fillRef idx="1">
-                <a:schemeClr val="lt1"/>
-              </a:fillRef>
-              <a:effectRef idx="0">
-                <a:schemeClr val="accent5"/>
-              </a:effectRef>
-              <a:fontRef idx="minor">
-                <a:schemeClr val="dk1"/>
-              </a:fontRef>
-            </p:style>
-            <p:txBody>
-              <a:bodyPr rtlCol="0" anchor="ctr"/>
-              <a:lstStyle/>
-              <a:p>
-                <a:r>
-                  <a:rPr lang="pt-BR" sz="1600" b="1" dirty="0" err="1" smtClean="0">
-                    <a:solidFill>
-                      <a:schemeClr val="tx1"/>
-                    </a:solidFill>
-                  </a:rPr>
-                  <a:t>New</a:t>
-                </a:r>
-                <a:r>
-                  <a:rPr lang="pt-BR" sz="1600" b="1" dirty="0" smtClean="0">
-                    <a:solidFill>
-                      <a:schemeClr val="tx1"/>
-                    </a:solidFill>
-                  </a:rPr>
-                  <a:t> Road</a:t>
-                </a:r>
-                <a:endParaRPr lang="pt-BR" sz="1600" b="1" dirty="0">
-                  <a:solidFill>
-                    <a:schemeClr val="tx1"/>
-                  </a:solidFill>
-                </a:endParaRPr>
-              </a:p>
-            </p:txBody>
-          </p:sp>
-          <p:sp>
-            <p:nvSpPr>
-              <p:cNvPr id="27" name="Retângulo 26"/>
-              <p:cNvSpPr/>
-              <p:nvPr/>
-            </p:nvSpPr>
-            <p:spPr>
-              <a:xfrm>
-                <a:off x="640221" y="1043669"/>
-                <a:ext cx="3133081" cy="1196148"/>
-              </a:xfrm>
-              <a:prstGeom prst="rect">
-                <a:avLst/>
-              </a:prstGeom>
-              <a:ln>
-                <a:solidFill>
-                  <a:schemeClr val="accent5">
-                    <a:lumMod val="60000"/>
-                    <a:lumOff val="40000"/>
-                  </a:schemeClr>
-                </a:solidFill>
-              </a:ln>
-            </p:spPr>
-            <p:style>
-              <a:lnRef idx="2">
-                <a:schemeClr val="accent5"/>
-              </a:lnRef>
-              <a:fillRef idx="1">
-                <a:schemeClr val="lt1"/>
-              </a:fillRef>
-              <a:effectRef idx="0">
-                <a:schemeClr val="accent5"/>
-              </a:effectRef>
-              <a:fontRef idx="minor">
-                <a:schemeClr val="dk1"/>
-              </a:fontRef>
-            </p:style>
-            <p:txBody>
-              <a:bodyPr rtlCol="0" anchor="t"/>
-              <a:lstStyle/>
-              <a:p>
-                <a:pPr algn="ctr"/>
-                <a:endParaRPr lang="pt-BR" sz="1400" dirty="0" smtClean="0"/>
-              </a:p>
-              <a:p>
-                <a:pPr algn="ctr"/>
-                <a:r>
-                  <a:rPr lang="pt-BR" sz="1400" dirty="0" err="1" smtClean="0"/>
-                  <a:t>How</a:t>
-                </a:r>
-                <a:r>
-                  <a:rPr lang="pt-BR" sz="1400" dirty="0" smtClean="0"/>
-                  <a:t> </a:t>
-                </a:r>
-                <a:r>
-                  <a:rPr lang="pt-BR" sz="1400" dirty="0" err="1" smtClean="0"/>
-                  <a:t>many</a:t>
-                </a:r>
-                <a:r>
-                  <a:rPr lang="pt-BR" sz="1400" dirty="0" smtClean="0"/>
-                  <a:t> </a:t>
-                </a:r>
-                <a:r>
-                  <a:rPr lang="pt-BR" sz="1400" dirty="0" err="1" smtClean="0"/>
-                  <a:t>lanes</a:t>
-                </a:r>
-                <a:r>
-                  <a:rPr lang="pt-BR" sz="1400" dirty="0" smtClean="0"/>
-                  <a:t> </a:t>
-                </a:r>
-                <a:r>
-                  <a:rPr lang="pt-BR" sz="1400" dirty="0" err="1" smtClean="0"/>
-                  <a:t>will</a:t>
-                </a:r>
-                <a:r>
-                  <a:rPr lang="pt-BR" sz="1400" dirty="0" smtClean="0"/>
-                  <a:t> </a:t>
-                </a:r>
-                <a:r>
-                  <a:rPr lang="pt-BR" sz="1400" dirty="0" err="1" smtClean="0"/>
-                  <a:t>this</a:t>
-                </a:r>
-                <a:r>
-                  <a:rPr lang="pt-BR" sz="1400" dirty="0" smtClean="0"/>
-                  <a:t> </a:t>
-                </a:r>
-                <a:r>
-                  <a:rPr lang="pt-BR" sz="1400" dirty="0" err="1" smtClean="0"/>
-                  <a:t>road</a:t>
-                </a:r>
-                <a:r>
-                  <a:rPr lang="pt-BR" sz="1400" dirty="0" smtClean="0"/>
-                  <a:t> </a:t>
-                </a:r>
-                <a:r>
-                  <a:rPr lang="pt-BR" sz="1400" dirty="0" err="1" smtClean="0"/>
-                  <a:t>have</a:t>
-                </a:r>
-                <a:r>
-                  <a:rPr lang="pt-BR" sz="1400" dirty="0" smtClean="0"/>
-                  <a:t>?</a:t>
-                </a:r>
-                <a:endParaRPr lang="pt-BR" sz="1400" dirty="0"/>
-              </a:p>
-            </p:txBody>
-          </p:sp>
-        </p:grpSp>
-        <p:sp>
-          <p:nvSpPr>
-            <p:cNvPr id="33" name="Retângulo 32"/>
-            <p:cNvSpPr/>
-            <p:nvPr/>
-          </p:nvSpPr>
-          <p:spPr>
-            <a:xfrm>
-              <a:off x="1142976" y="1680480"/>
-              <a:ext cx="714380" cy="285752"/>
-            </a:xfrm>
-            <a:prstGeom prst="rect">
-              <a:avLst/>
-            </a:prstGeom>
-            <a:solidFill>
-              <a:schemeClr val="bg1"/>
-            </a:solidFill>
-            <a:ln w="3175">
-              <a:solidFill>
-                <a:schemeClr val="accent5">
-                  <a:lumMod val="75000"/>
-                </a:schemeClr>
-              </a:solidFill>
-            </a:ln>
-          </p:spPr>
-          <p:style>
-            <a:lnRef idx="2">
-              <a:schemeClr val="accent1">
-                <a:shade val="50000"/>
-              </a:schemeClr>
-            </a:lnRef>
-            <a:fillRef idx="1">
-              <a:schemeClr val="accent1"/>
-            </a:fillRef>
-            <a:effectRef idx="0">
-              <a:schemeClr val="accent1"/>
-            </a:effectRef>
-            <a:fontRef idx="minor">
-              <a:schemeClr val="lt1"/>
-            </a:fontRef>
-          </p:style>
-          <p:txBody>
-            <a:bodyPr rtlCol="0" anchor="ctr"/>
-            <a:lstStyle/>
-            <a:p>
-              <a:pPr algn="ctr"/>
-              <a:endParaRPr lang="pt-BR"/>
-            </a:p>
-          </p:txBody>
-        </p:sp>
-        <p:sp>
-          <p:nvSpPr>
-            <p:cNvPr id="34" name="Retângulo de cantos arredondados 33"/>
-            <p:cNvSpPr/>
-            <p:nvPr/>
-          </p:nvSpPr>
-          <p:spPr>
-            <a:xfrm>
-              <a:off x="2143108" y="1667601"/>
-              <a:ext cx="1000132" cy="285752"/>
-            </a:xfrm>
-            <a:prstGeom prst="roundRect">
-              <a:avLst/>
-            </a:prstGeom>
-          </p:spPr>
-          <p:style>
-            <a:lnRef idx="1">
-              <a:schemeClr val="accent1"/>
-            </a:lnRef>
-            <a:fillRef idx="2">
-              <a:schemeClr val="accent1"/>
-            </a:fillRef>
-            <a:effectRef idx="1">
-              <a:schemeClr val="accent1"/>
-            </a:effectRef>
-            <a:fontRef idx="minor">
-              <a:schemeClr val="dk1"/>
-            </a:fontRef>
-          </p:style>
-          <p:txBody>
-            <a:bodyPr rtlCol="0" anchor="ctr"/>
-            <a:lstStyle/>
-            <a:p>
-              <a:pPr algn="ctr"/>
-              <a:r>
-                <a:rPr lang="pt-BR" sz="1600" dirty="0" smtClean="0"/>
-                <a:t>OK</a:t>
-              </a:r>
-              <a:endParaRPr lang="pt-BR" sz="1600" dirty="0"/>
-            </a:p>
-          </p:txBody>
-        </p:sp>
-      </p:grpSp>
-      <p:grpSp>
-        <p:nvGrpSpPr>
           <p:cNvPr id="54" name="Grupo 53"/>
           <p:cNvGrpSpPr/>
           <p:nvPr/>
         </p:nvGrpSpPr>
         <p:grpSpPr>
           <a:xfrm>
-            <a:off x="562655" y="3429000"/>
-            <a:ext cx="2492208" cy="2689075"/>
-            <a:chOff x="570748" y="2714622"/>
-            <a:chExt cx="2492208" cy="2689075"/>
+            <a:off x="562655" y="3519153"/>
+            <a:ext cx="2492208" cy="2598918"/>
+            <a:chOff x="570748" y="2804775"/>
+            <a:chExt cx="2492208" cy="2598918"/>
           </a:xfrm>
         </p:grpSpPr>
         <p:grpSp>
@@ -4856,10 +4522,10 @@
           </p:nvGrpSpPr>
           <p:grpSpPr>
             <a:xfrm>
-              <a:off x="570748" y="2714622"/>
-              <a:ext cx="2492208" cy="2689075"/>
-              <a:chOff x="641977" y="642921"/>
-              <a:chExt cx="3144206" cy="1770854"/>
+              <a:off x="570748" y="2804775"/>
+              <a:ext cx="2492208" cy="2598918"/>
+              <a:chOff x="641977" y="702291"/>
+              <a:chExt cx="3144206" cy="1711483"/>
             </a:xfrm>
           </p:grpSpPr>
           <p:grpSp>
@@ -4870,10 +4536,10 @@
             </p:nvGrpSpPr>
             <p:grpSpPr>
               <a:xfrm>
-                <a:off x="641977" y="642921"/>
-                <a:ext cx="3144206" cy="1770854"/>
-                <a:chOff x="641976" y="642918"/>
-                <a:chExt cx="3144206" cy="1853179"/>
+                <a:off x="641977" y="702291"/>
+                <a:ext cx="3144206" cy="1711483"/>
+                <a:chOff x="641976" y="705047"/>
+                <a:chExt cx="3144206" cy="1791050"/>
               </a:xfrm>
             </p:grpSpPr>
             <p:sp>
@@ -4939,8 +4605,8 @@
               </p:nvSpPr>
               <p:spPr>
                 <a:xfrm>
-                  <a:off x="641976" y="642918"/>
-                  <a:ext cx="3133081" cy="357190"/>
+                  <a:off x="641976" y="705047"/>
+                  <a:ext cx="3133081" cy="245614"/>
                 </a:xfrm>
                 <a:prstGeom prst="roundRect">
                   <a:avLst/>
@@ -5056,8 +4722,8 @@
               </p:nvSpPr>
               <p:spPr>
                 <a:xfrm>
-                  <a:off x="3407361" y="702471"/>
-                  <a:ext cx="273515" cy="159977"/>
+                  <a:off x="3423609" y="746849"/>
+                  <a:ext cx="273516" cy="159977"/>
                 </a:xfrm>
                 <a:prstGeom prst="mathMultiply">
                   <a:avLst/>
@@ -5108,7 +4774,7 @@
             </p:nvSpPr>
             <p:spPr>
               <a:xfrm>
-                <a:off x="2679422" y="1106855"/>
+                <a:off x="2684589" y="1106856"/>
                 <a:ext cx="747079" cy="211650"/>
               </a:xfrm>
               <a:prstGeom prst="rect">
@@ -5159,7 +4825,7 @@
             <p:spPr>
               <a:xfrm>
                 <a:off x="1067676" y="2054255"/>
-                <a:ext cx="857255" cy="193406"/>
+                <a:ext cx="1080951" cy="187288"/>
               </a:xfrm>
               <a:prstGeom prst="roundRect">
                 <a:avLst/>
@@ -5201,8 +4867,8 @@
           </p:nvSpPr>
           <p:spPr>
             <a:xfrm>
-              <a:off x="1857356" y="4857760"/>
-              <a:ext cx="857256" cy="293690"/>
+              <a:off x="1857356" y="4857759"/>
+              <a:ext cx="857256" cy="284400"/>
             </a:xfrm>
             <a:prstGeom prst="roundRect">
               <a:avLst/>
@@ -5243,7 +4909,7 @@
           </p:nvSpPr>
           <p:spPr>
             <a:xfrm>
-              <a:off x="729884" y="3432733"/>
+              <a:off x="729884" y="3425924"/>
               <a:ext cx="530210" cy="307777"/>
             </a:xfrm>
             <a:prstGeom prst="rect">
@@ -5273,7 +4939,7 @@
           </p:nvSpPr>
           <p:spPr>
             <a:xfrm>
-              <a:off x="712610" y="3828560"/>
+              <a:off x="712610" y="3848482"/>
               <a:ext cx="1299330" cy="307777"/>
             </a:xfrm>
             <a:prstGeom prst="rect">
@@ -5311,7 +4977,7 @@
           </p:nvSpPr>
           <p:spPr>
             <a:xfrm>
-              <a:off x="714348" y="4282946"/>
+              <a:off x="714348" y="4291410"/>
               <a:ext cx="1328825" cy="307777"/>
             </a:xfrm>
             <a:prstGeom prst="rect">
@@ -5349,7 +5015,7 @@
           </p:nvSpPr>
           <p:spPr>
             <a:xfrm>
-              <a:off x="2192750" y="3854786"/>
+              <a:off x="2189224" y="3841673"/>
               <a:ext cx="593300" cy="321395"/>
             </a:xfrm>
             <a:prstGeom prst="rect">
@@ -5399,7 +5065,7 @@
           </p:nvSpPr>
           <p:spPr>
             <a:xfrm>
-              <a:off x="2192750" y="4286256"/>
+              <a:off x="2189224" y="4284601"/>
               <a:ext cx="593300" cy="321395"/>
             </a:xfrm>
             <a:prstGeom prst="rect">
@@ -5450,10 +5116,10 @@
         </p:nvGrpSpPr>
         <p:grpSpPr>
           <a:xfrm>
-            <a:off x="3987468" y="642918"/>
-            <a:ext cx="2496425" cy="1779101"/>
-            <a:chOff x="583629" y="2714621"/>
-            <a:chExt cx="2501218" cy="1779101"/>
+            <a:off x="4488543" y="656587"/>
+            <a:ext cx="2496019" cy="1681115"/>
+            <a:chOff x="558534" y="2799728"/>
+            <a:chExt cx="2500811" cy="1681115"/>
           </a:xfrm>
         </p:grpSpPr>
         <p:grpSp>
@@ -5464,10 +5130,10 @@
           </p:nvGrpSpPr>
           <p:grpSpPr>
             <a:xfrm>
-              <a:off x="583629" y="2714621"/>
-              <a:ext cx="2501218" cy="1779101"/>
-              <a:chOff x="658226" y="642921"/>
-              <a:chExt cx="3155575" cy="1171603"/>
+              <a:off x="558534" y="2799728"/>
+              <a:ext cx="2500811" cy="1681115"/>
+              <a:chOff x="626565" y="698967"/>
+              <a:chExt cx="3155061" cy="1107076"/>
             </a:xfrm>
           </p:grpSpPr>
           <p:grpSp>
@@ -5478,10 +5144,10 @@
             </p:nvGrpSpPr>
             <p:grpSpPr>
               <a:xfrm>
-                <a:off x="658226" y="642921"/>
-                <a:ext cx="3155575" cy="1171603"/>
-                <a:chOff x="658225" y="642918"/>
-                <a:chExt cx="3155575" cy="1226068"/>
+                <a:off x="626565" y="698967"/>
+                <a:ext cx="3155061" cy="1107076"/>
+                <a:chOff x="626564" y="701569"/>
+                <a:chExt cx="3155061" cy="1158542"/>
               </a:xfrm>
             </p:grpSpPr>
             <p:sp>
@@ -5492,8 +5158,8 @@
               </p:nvSpPr>
               <p:spPr>
                 <a:xfrm>
-                  <a:off x="659124" y="1721159"/>
-                  <a:ext cx="3139869" cy="147827"/>
+                  <a:off x="626564" y="1712284"/>
+                  <a:ext cx="3144419" cy="147827"/>
                 </a:xfrm>
                 <a:prstGeom prst="roundRect">
                   <a:avLst/>
@@ -5547,8 +5213,8 @@
               </p:nvSpPr>
               <p:spPr>
                 <a:xfrm>
-                  <a:off x="658225" y="642918"/>
-                  <a:ext cx="3144420" cy="357190"/>
+                  <a:off x="641756" y="701569"/>
+                  <a:ext cx="3139869" cy="245613"/>
                 </a:xfrm>
                 <a:prstGeom prst="roundRect">
                   <a:avLst/>
@@ -5614,8 +5280,8 @@
               </p:nvSpPr>
               <p:spPr>
                 <a:xfrm>
-                  <a:off x="669380" y="933077"/>
-                  <a:ext cx="3144420" cy="891399"/>
+                  <a:off x="636821" y="933077"/>
+                  <a:ext cx="3139870" cy="891399"/>
                 </a:xfrm>
                 <a:prstGeom prst="rect">
                   <a:avLst/>
@@ -5664,7 +5330,7 @@
               </p:nvSpPr>
               <p:spPr>
                 <a:xfrm>
-                  <a:off x="3407361" y="702471"/>
+                  <a:off x="3407361" y="737973"/>
                   <a:ext cx="273515" cy="159977"/>
                 </a:xfrm>
                 <a:prstGeom prst="mathMultiply">
@@ -5717,7 +5383,7 @@
             <p:spPr>
               <a:xfrm>
                 <a:off x="2430336" y="1089895"/>
-                <a:ext cx="993305" cy="211650"/>
+                <a:ext cx="993304" cy="211650"/>
               </a:xfrm>
               <a:prstGeom prst="rect">
                 <a:avLst/>
@@ -5766,8 +5432,8 @@
             </p:nvSpPr>
             <p:spPr>
               <a:xfrm>
-                <a:off x="1067676" y="1442678"/>
-                <a:ext cx="857255" cy="193406"/>
+                <a:off x="1002959" y="1442678"/>
+                <a:ext cx="1083027" cy="187288"/>
               </a:xfrm>
               <a:prstGeom prst="roundRect">
                 <a:avLst/>
@@ -5809,8 +5475,8 @@
           </p:nvSpPr>
           <p:spPr>
             <a:xfrm>
-              <a:off x="1794013" y="3929067"/>
-              <a:ext cx="857256" cy="293690"/>
+              <a:off x="1860575" y="3929067"/>
+              <a:ext cx="857256" cy="284400"/>
             </a:xfrm>
             <a:prstGeom prst="roundRect">
               <a:avLst/>
@@ -5851,7 +5517,7 @@
           </p:nvSpPr>
           <p:spPr>
             <a:xfrm>
-              <a:off x="722443" y="3406976"/>
+              <a:off x="722443" y="3400168"/>
               <a:ext cx="992516" cy="307777"/>
             </a:xfrm>
             <a:prstGeom prst="rect">
@@ -5886,7 +5552,7 @@
         </p:nvSpPr>
         <p:spPr>
           <a:xfrm>
-            <a:off x="3279073" y="767971"/>
+            <a:off x="2571736" y="785794"/>
             <a:ext cx="216382" cy="232137"/>
           </a:xfrm>
           <a:prstGeom prst="mathMultiply">
@@ -5937,10 +5603,10 @@
         </p:nvGrpSpPr>
         <p:grpSpPr>
           <a:xfrm>
-            <a:off x="4071934" y="3571874"/>
-            <a:ext cx="3701897" cy="2357455"/>
-            <a:chOff x="583629" y="2766947"/>
-            <a:chExt cx="2492546" cy="1726774"/>
+            <a:off x="4071934" y="3674906"/>
+            <a:ext cx="3701897" cy="2177157"/>
+            <a:chOff x="583629" y="2842411"/>
+            <a:chExt cx="2492546" cy="1594708"/>
           </a:xfrm>
         </p:grpSpPr>
         <p:grpSp>
@@ -5951,10 +5617,10 @@
           </p:nvGrpSpPr>
           <p:grpSpPr>
             <a:xfrm>
-              <a:off x="583629" y="2766947"/>
-              <a:ext cx="2492546" cy="1726774"/>
-              <a:chOff x="658226" y="677379"/>
-              <a:chExt cx="3144634" cy="1137143"/>
+              <a:off x="583629" y="2842411"/>
+              <a:ext cx="2492546" cy="1594708"/>
+              <a:chOff x="658226" y="727075"/>
+              <a:chExt cx="3144634" cy="1050173"/>
             </a:xfrm>
           </p:grpSpPr>
           <p:grpSp>
@@ -5965,10 +5631,10 @@
             </p:nvGrpSpPr>
             <p:grpSpPr>
               <a:xfrm>
-                <a:off x="658226" y="677379"/>
-                <a:ext cx="3144634" cy="1137143"/>
-                <a:chOff x="658225" y="678979"/>
-                <a:chExt cx="3144634" cy="1190007"/>
+                <a:off x="658226" y="727075"/>
+                <a:ext cx="3144634" cy="1050173"/>
+                <a:chOff x="658225" y="730987"/>
+                <a:chExt cx="3144634" cy="1098991"/>
               </a:xfrm>
             </p:grpSpPr>
             <p:sp>
@@ -5979,8 +5645,8 @@
               </p:nvSpPr>
               <p:spPr>
                 <a:xfrm>
-                  <a:off x="659124" y="1721159"/>
-                  <a:ext cx="3139869" cy="147827"/>
+                  <a:off x="659124" y="1682151"/>
+                  <a:ext cx="3143702" cy="147827"/>
                 </a:xfrm>
                 <a:prstGeom prst="roundRect">
                   <a:avLst/>
@@ -6034,8 +5700,8 @@
               </p:nvSpPr>
               <p:spPr>
                 <a:xfrm>
-                  <a:off x="658225" y="678979"/>
-                  <a:ext cx="3144419" cy="285067"/>
+                  <a:off x="658225" y="730987"/>
+                  <a:ext cx="3144419" cy="179905"/>
                 </a:xfrm>
                 <a:prstGeom prst="roundRect">
                   <a:avLst/>
@@ -6152,8 +5818,8 @@
             </p:nvSpPr>
             <p:spPr>
               <a:xfrm>
-                <a:off x="2236014" y="1066321"/>
-                <a:ext cx="993305" cy="127942"/>
+                <a:off x="2236014" y="1039712"/>
+                <a:ext cx="993305" cy="154548"/>
               </a:xfrm>
               <a:prstGeom prst="rect">
                 <a:avLst/>
@@ -6202,8 +5868,8 @@
             </p:nvSpPr>
             <p:spPr>
               <a:xfrm>
-                <a:off x="961647" y="1544996"/>
-                <a:ext cx="1082559" cy="131691"/>
+                <a:off x="1386435" y="1545356"/>
+                <a:ext cx="727822" cy="137183"/>
               </a:xfrm>
               <a:prstGeom prst="roundRect">
                 <a:avLst/>
@@ -6245,8 +5911,8 @@
           </p:nvSpPr>
           <p:spPr>
             <a:xfrm>
-              <a:off x="1890889" y="4084441"/>
-              <a:ext cx="857256" cy="199974"/>
+              <a:off x="1834238" y="4089157"/>
+              <a:ext cx="576897" cy="199974"/>
             </a:xfrm>
             <a:prstGeom prst="roundRect">
               <a:avLst/>
@@ -6287,8 +5953,8 @@
           </p:nvSpPr>
           <p:spPr>
             <a:xfrm>
-              <a:off x="1185351" y="3357563"/>
-              <a:ext cx="312185" cy="307777"/>
+              <a:off x="1159336" y="3321779"/>
+              <a:ext cx="312185" cy="225438"/>
             </a:xfrm>
             <a:prstGeom prst="rect">
               <a:avLst/>
@@ -6296,7 +5962,7 @@
             <a:noFill/>
           </p:spPr>
           <p:txBody>
-            <a:bodyPr wrap="none" rtlCol="0">
+            <a:bodyPr wrap="square" rtlCol="0">
               <a:spAutoFit/>
             </a:bodyPr>
             <a:lstStyle/>
@@ -6318,8 +5984,8 @@
         </p:nvSpPr>
         <p:spPr>
           <a:xfrm>
-            <a:off x="5922923" y="4806833"/>
-            <a:ext cx="1169329" cy="265241"/>
+            <a:off x="5922923" y="4786322"/>
+            <a:ext cx="1169329" cy="320400"/>
           </a:xfrm>
           <a:prstGeom prst="rect">
             <a:avLst/>
@@ -6368,7 +6034,7 @@
         </p:nvSpPr>
         <p:spPr>
           <a:xfrm>
-            <a:off x="4929190" y="4794761"/>
+            <a:off x="4929190" y="4792634"/>
             <a:ext cx="632737" cy="307777"/>
           </a:xfrm>
           <a:prstGeom prst="rect">
@@ -6398,8 +6064,521 @@
         </p:nvSpPr>
         <p:spPr>
           <a:xfrm>
-            <a:off x="7448235" y="3676115"/>
+            <a:off x="7472716" y="3716852"/>
             <a:ext cx="216798" cy="232136"/>
+          </a:xfrm>
+          <a:prstGeom prst="mathMultiply">
+            <a:avLst/>
+          </a:prstGeom>
+          <a:solidFill>
+            <a:schemeClr val="accent2">
+              <a:lumMod val="60000"/>
+              <a:lumOff val="40000"/>
+            </a:schemeClr>
+          </a:solidFill>
+          <a:ln>
+            <a:solidFill>
+              <a:schemeClr val="accent2"/>
+            </a:solidFill>
+          </a:ln>
+        </p:spPr>
+        <p:style>
+          <a:lnRef idx="2">
+            <a:schemeClr val="accent1">
+              <a:shade val="50000"/>
+            </a:schemeClr>
+          </a:lnRef>
+          <a:fillRef idx="1">
+            <a:schemeClr val="accent1"/>
+          </a:fillRef>
+          <a:effectRef idx="0">
+            <a:schemeClr val="accent1"/>
+          </a:effectRef>
+          <a:fontRef idx="minor">
+            <a:schemeClr val="lt1"/>
+          </a:fontRef>
+        </p:style>
+        <p:txBody>
+          <a:bodyPr rtlCol="0" anchor="ctr"/>
+          <a:lstStyle/>
+          <a:p>
+            <a:pPr algn="ctr"/>
+            <a:endParaRPr lang="pt-BR"/>
+          </a:p>
+        </p:txBody>
+      </p:sp>
+      <p:grpSp>
+        <p:nvGrpSpPr>
+          <p:cNvPr id="62" name="Grupo 61"/>
+          <p:cNvGrpSpPr/>
+          <p:nvPr/>
+        </p:nvGrpSpPr>
+        <p:grpSpPr>
+          <a:xfrm>
+            <a:off x="642910" y="740114"/>
+            <a:ext cx="2857520" cy="2234501"/>
+            <a:chOff x="285720" y="740114"/>
+            <a:chExt cx="2857520" cy="2234501"/>
+          </a:xfrm>
+        </p:grpSpPr>
+        <p:grpSp>
+          <p:nvGrpSpPr>
+            <p:cNvPr id="32" name="Grupo 31"/>
+            <p:cNvGrpSpPr/>
+            <p:nvPr/>
+          </p:nvGrpSpPr>
+          <p:grpSpPr>
+            <a:xfrm>
+              <a:off x="285720" y="740114"/>
+              <a:ext cx="2569563" cy="2234501"/>
+              <a:chOff x="640221" y="661685"/>
+              <a:chExt cx="3133080" cy="1628016"/>
+            </a:xfrm>
+          </p:grpSpPr>
+          <p:sp>
+            <p:nvSpPr>
+              <p:cNvPr id="13" name="Retângulo de cantos arredondados 12"/>
+              <p:cNvSpPr/>
+              <p:nvPr/>
+            </p:nvSpPr>
+            <p:spPr>
+              <a:xfrm>
+                <a:off x="642910" y="2141874"/>
+                <a:ext cx="3129711" cy="147827"/>
+              </a:xfrm>
+              <a:prstGeom prst="roundRect">
+                <a:avLst/>
+              </a:prstGeom>
+              <a:solidFill>
+                <a:schemeClr val="accent1">
+                  <a:lumMod val="20000"/>
+                  <a:lumOff val="80000"/>
+                </a:schemeClr>
+              </a:solidFill>
+              <a:ln>
+                <a:solidFill>
+                  <a:schemeClr val="accent5">
+                    <a:lumMod val="60000"/>
+                    <a:lumOff val="40000"/>
+                  </a:schemeClr>
+                </a:solidFill>
+              </a:ln>
+            </p:spPr>
+            <p:style>
+              <a:lnRef idx="2">
+                <a:schemeClr val="accent5"/>
+              </a:lnRef>
+              <a:fillRef idx="1">
+                <a:schemeClr val="lt1"/>
+              </a:fillRef>
+              <a:effectRef idx="0">
+                <a:schemeClr val="accent5"/>
+              </a:effectRef>
+              <a:fontRef idx="minor">
+                <a:schemeClr val="dk1"/>
+              </a:fontRef>
+            </p:style>
+            <p:txBody>
+              <a:bodyPr rtlCol="0" anchor="ctr"/>
+              <a:lstStyle/>
+              <a:p>
+                <a:endParaRPr lang="pt-BR" sz="1400" dirty="0">
+                  <a:solidFill>
+                    <a:schemeClr val="tx1"/>
+                  </a:solidFill>
+                </a:endParaRPr>
+              </a:p>
+            </p:txBody>
+          </p:sp>
+          <p:sp>
+            <p:nvSpPr>
+              <p:cNvPr id="26" name="Retângulo de cantos arredondados 25"/>
+              <p:cNvSpPr/>
+              <p:nvPr/>
+            </p:nvSpPr>
+            <p:spPr>
+              <a:xfrm>
+                <a:off x="642910" y="661685"/>
+                <a:ext cx="3129711" cy="260242"/>
+              </a:xfrm>
+              <a:prstGeom prst="roundRect">
+                <a:avLst/>
+              </a:prstGeom>
+              <a:solidFill>
+                <a:schemeClr val="accent1">
+                  <a:lumMod val="20000"/>
+                  <a:lumOff val="80000"/>
+                </a:schemeClr>
+              </a:solidFill>
+              <a:ln>
+                <a:solidFill>
+                  <a:schemeClr val="accent5">
+                    <a:lumMod val="60000"/>
+                    <a:lumOff val="40000"/>
+                  </a:schemeClr>
+                </a:solidFill>
+              </a:ln>
+            </p:spPr>
+            <p:style>
+              <a:lnRef idx="2">
+                <a:schemeClr val="accent5"/>
+              </a:lnRef>
+              <a:fillRef idx="1">
+                <a:schemeClr val="lt1"/>
+              </a:fillRef>
+              <a:effectRef idx="0">
+                <a:schemeClr val="accent5"/>
+              </a:effectRef>
+              <a:fontRef idx="minor">
+                <a:schemeClr val="dk1"/>
+              </a:fontRef>
+            </p:style>
+            <p:txBody>
+              <a:bodyPr rtlCol="0" anchor="ctr"/>
+              <a:lstStyle/>
+              <a:p>
+                <a:r>
+                  <a:rPr lang="pt-BR" sz="1600" b="1" dirty="0" err="1" smtClean="0">
+                    <a:solidFill>
+                      <a:schemeClr val="tx1"/>
+                    </a:solidFill>
+                  </a:rPr>
+                  <a:t>New</a:t>
+                </a:r>
+                <a:r>
+                  <a:rPr lang="pt-BR" sz="1600" b="1" dirty="0" smtClean="0">
+                    <a:solidFill>
+                      <a:schemeClr val="tx1"/>
+                    </a:solidFill>
+                  </a:rPr>
+                  <a:t> Road</a:t>
+                </a:r>
+                <a:endParaRPr lang="pt-BR" sz="1600" b="1" dirty="0">
+                  <a:solidFill>
+                    <a:schemeClr val="tx1"/>
+                  </a:solidFill>
+                </a:endParaRPr>
+              </a:p>
+            </p:txBody>
+          </p:sp>
+          <p:sp>
+            <p:nvSpPr>
+              <p:cNvPr id="27" name="Retângulo 26"/>
+              <p:cNvSpPr/>
+              <p:nvPr/>
+            </p:nvSpPr>
+            <p:spPr>
+              <a:xfrm>
+                <a:off x="640221" y="903160"/>
+                <a:ext cx="3133080" cy="1336656"/>
+              </a:xfrm>
+              <a:prstGeom prst="rect">
+                <a:avLst/>
+              </a:prstGeom>
+              <a:ln>
+                <a:solidFill>
+                  <a:schemeClr val="accent5">
+                    <a:lumMod val="60000"/>
+                    <a:lumOff val="40000"/>
+                  </a:schemeClr>
+                </a:solidFill>
+              </a:ln>
+            </p:spPr>
+            <p:style>
+              <a:lnRef idx="2">
+                <a:schemeClr val="accent5"/>
+              </a:lnRef>
+              <a:fillRef idx="1">
+                <a:schemeClr val="lt1"/>
+              </a:fillRef>
+              <a:effectRef idx="0">
+                <a:schemeClr val="accent5"/>
+              </a:effectRef>
+              <a:fontRef idx="minor">
+                <a:schemeClr val="dk1"/>
+              </a:fontRef>
+            </p:style>
+            <p:txBody>
+              <a:bodyPr rtlCol="0" anchor="t"/>
+              <a:lstStyle/>
+              <a:p>
+                <a:pPr algn="ctr"/>
+                <a:endParaRPr lang="pt-BR" sz="1400" dirty="0" smtClean="0"/>
+              </a:p>
+              <a:p>
+                <a:pPr algn="ctr"/>
+                <a:endParaRPr lang="pt-BR" sz="1400" u="sng" dirty="0"/>
+              </a:p>
+            </p:txBody>
+          </p:sp>
+        </p:grpSp>
+        <p:sp>
+          <p:nvSpPr>
+            <p:cNvPr id="51" name="CaixaDeTexto 50"/>
+            <p:cNvSpPr txBox="1"/>
+            <p:nvPr/>
+          </p:nvSpPr>
+          <p:spPr>
+            <a:xfrm>
+              <a:off x="428596" y="1413676"/>
+              <a:ext cx="2714644" cy="307777"/>
+            </a:xfrm>
+            <a:prstGeom prst="rect">
+              <a:avLst/>
+            </a:prstGeom>
+            <a:noFill/>
+          </p:spPr>
+          <p:txBody>
+            <a:bodyPr wrap="square" rtlCol="0">
+              <a:spAutoFit/>
+            </a:bodyPr>
+            <a:lstStyle/>
+            <a:p>
+              <a:r>
+                <a:rPr lang="pt-BR" sz="1400" dirty="0" err="1" smtClean="0"/>
+                <a:t>Lanes</a:t>
+              </a:r>
+              <a:r>
+                <a:rPr lang="pt-BR" sz="1400" dirty="0" smtClean="0"/>
+                <a:t> </a:t>
+              </a:r>
+              <a:r>
+                <a:rPr lang="pt-BR" sz="1400" dirty="0" err="1" smtClean="0"/>
+                <a:t>Number</a:t>
+              </a:r>
+              <a:endParaRPr lang="pt-BR" sz="1400" dirty="0"/>
+            </a:p>
+          </p:txBody>
+        </p:sp>
+        <p:sp>
+          <p:nvSpPr>
+            <p:cNvPr id="59" name="Retângulo 58"/>
+            <p:cNvSpPr/>
+            <p:nvPr/>
+          </p:nvSpPr>
+          <p:spPr>
+            <a:xfrm>
+              <a:off x="1693275" y="1928802"/>
+              <a:ext cx="785819" cy="321394"/>
+            </a:xfrm>
+            <a:prstGeom prst="rect">
+              <a:avLst/>
+            </a:prstGeom>
+            <a:solidFill>
+              <a:schemeClr val="bg1"/>
+            </a:solidFill>
+            <a:ln w="3175">
+              <a:solidFill>
+                <a:schemeClr val="accent5">
+                  <a:lumMod val="75000"/>
+                </a:schemeClr>
+              </a:solidFill>
+            </a:ln>
+          </p:spPr>
+          <p:style>
+            <a:lnRef idx="2">
+              <a:schemeClr val="accent1">
+                <a:shade val="50000"/>
+              </a:schemeClr>
+            </a:lnRef>
+            <a:fillRef idx="1">
+              <a:schemeClr val="accent1"/>
+            </a:fillRef>
+            <a:effectRef idx="0">
+              <a:schemeClr val="accent1"/>
+            </a:effectRef>
+            <a:fontRef idx="minor">
+              <a:schemeClr val="lt1"/>
+            </a:fontRef>
+          </p:style>
+          <p:txBody>
+            <a:bodyPr rtlCol="0" anchor="ctr"/>
+            <a:lstStyle/>
+            <a:p>
+              <a:pPr algn="ctr"/>
+              <a:endParaRPr lang="pt-BR"/>
+            </a:p>
+          </p:txBody>
+        </p:sp>
+        <p:sp>
+          <p:nvSpPr>
+            <p:cNvPr id="60" name="CaixaDeTexto 59"/>
+            <p:cNvSpPr txBox="1"/>
+            <p:nvPr/>
+          </p:nvSpPr>
+          <p:spPr>
+            <a:xfrm>
+              <a:off x="428596" y="1935611"/>
+              <a:ext cx="990614" cy="307777"/>
+            </a:xfrm>
+            <a:prstGeom prst="rect">
+              <a:avLst/>
+            </a:prstGeom>
+            <a:noFill/>
+          </p:spPr>
+          <p:txBody>
+            <a:bodyPr wrap="none" rtlCol="0">
+              <a:spAutoFit/>
+            </a:bodyPr>
+            <a:lstStyle/>
+            <a:p>
+              <a:r>
+                <a:rPr lang="pt-BR" sz="1400" dirty="0" smtClean="0"/>
+                <a:t>Max </a:t>
+              </a:r>
+              <a:r>
+                <a:rPr lang="pt-BR" sz="1400" dirty="0" err="1" smtClean="0"/>
+                <a:t>Speed</a:t>
+              </a:r>
+              <a:endParaRPr lang="pt-BR" sz="1400" dirty="0"/>
+            </a:p>
+          </p:txBody>
+        </p:sp>
+        <p:sp>
+          <p:nvSpPr>
+            <p:cNvPr id="61" name="Retângulo 60"/>
+            <p:cNvSpPr/>
+            <p:nvPr/>
+          </p:nvSpPr>
+          <p:spPr>
+            <a:xfrm>
+              <a:off x="1693275" y="1406867"/>
+              <a:ext cx="785819" cy="321394"/>
+            </a:xfrm>
+            <a:prstGeom prst="rect">
+              <a:avLst/>
+            </a:prstGeom>
+            <a:solidFill>
+              <a:schemeClr val="bg1"/>
+            </a:solidFill>
+            <a:ln w="3175">
+              <a:solidFill>
+                <a:schemeClr val="accent5">
+                  <a:lumMod val="75000"/>
+                </a:schemeClr>
+              </a:solidFill>
+            </a:ln>
+          </p:spPr>
+          <p:style>
+            <a:lnRef idx="2">
+              <a:schemeClr val="accent1">
+                <a:shade val="50000"/>
+              </a:schemeClr>
+            </a:lnRef>
+            <a:fillRef idx="1">
+              <a:schemeClr val="accent1"/>
+            </a:fillRef>
+            <a:effectRef idx="0">
+              <a:schemeClr val="accent1"/>
+            </a:effectRef>
+            <a:fontRef idx="minor">
+              <a:schemeClr val="lt1"/>
+            </a:fontRef>
+          </p:style>
+          <p:txBody>
+            <a:bodyPr rtlCol="0" anchor="ctr"/>
+            <a:lstStyle/>
+            <a:p>
+              <a:pPr algn="ctr"/>
+              <a:endParaRPr lang="pt-BR"/>
+            </a:p>
+          </p:txBody>
+        </p:sp>
+      </p:grpSp>
+      <p:sp>
+        <p:nvSpPr>
+          <p:cNvPr id="81" name="Retângulo de cantos arredondados 80"/>
+          <p:cNvSpPr/>
+          <p:nvPr/>
+        </p:nvSpPr>
+        <p:spPr>
+          <a:xfrm>
+            <a:off x="961919" y="2441747"/>
+            <a:ext cx="856800" cy="284400"/>
+          </a:xfrm>
+          <a:prstGeom prst="roundRect">
+            <a:avLst/>
+          </a:prstGeom>
+        </p:spPr>
+        <p:style>
+          <a:lnRef idx="1">
+            <a:schemeClr val="accent1"/>
+          </a:lnRef>
+          <a:fillRef idx="2">
+            <a:schemeClr val="accent1"/>
+          </a:fillRef>
+          <a:effectRef idx="1">
+            <a:schemeClr val="accent1"/>
+          </a:effectRef>
+          <a:fontRef idx="minor">
+            <a:schemeClr val="dk1"/>
+          </a:fontRef>
+        </p:style>
+        <p:txBody>
+          <a:bodyPr rtlCol="0" anchor="ctr"/>
+          <a:lstStyle/>
+          <a:p>
+            <a:pPr algn="ctr"/>
+            <a:r>
+              <a:rPr lang="pt-BR" sz="1600" dirty="0" smtClean="0"/>
+              <a:t>OK</a:t>
+            </a:r>
+            <a:endParaRPr lang="pt-BR" sz="1600" dirty="0"/>
+          </a:p>
+        </p:txBody>
+      </p:sp>
+      <p:sp>
+        <p:nvSpPr>
+          <p:cNvPr id="82" name="Retângulo de cantos arredondados 81"/>
+          <p:cNvSpPr/>
+          <p:nvPr/>
+        </p:nvSpPr>
+        <p:spPr>
+          <a:xfrm>
+            <a:off x="1962051" y="2441747"/>
+            <a:ext cx="856800" cy="284400"/>
+          </a:xfrm>
+          <a:prstGeom prst="roundRect">
+            <a:avLst/>
+          </a:prstGeom>
+        </p:spPr>
+        <p:style>
+          <a:lnRef idx="1">
+            <a:schemeClr val="accent1"/>
+          </a:lnRef>
+          <a:fillRef idx="2">
+            <a:schemeClr val="accent1"/>
+          </a:fillRef>
+          <a:effectRef idx="1">
+            <a:schemeClr val="accent1"/>
+          </a:effectRef>
+          <a:fontRef idx="minor">
+            <a:schemeClr val="dk1"/>
+          </a:fontRef>
+        </p:style>
+        <p:txBody>
+          <a:bodyPr rtlCol="0" anchor="ctr"/>
+          <a:lstStyle/>
+          <a:p>
+            <a:pPr algn="ctr"/>
+            <a:r>
+              <a:rPr lang="pt-BR" sz="1600" dirty="0" err="1" smtClean="0"/>
+              <a:t>Cancel</a:t>
+            </a:r>
+            <a:endParaRPr lang="pt-BR" sz="1600" dirty="0"/>
+          </a:p>
+        </p:txBody>
+      </p:sp>
+      <p:sp>
+        <p:nvSpPr>
+          <p:cNvPr id="83" name="Multiplicar 82"/>
+          <p:cNvSpPr/>
+          <p:nvPr/>
+        </p:nvSpPr>
+        <p:spPr>
+          <a:xfrm>
+            <a:off x="2916047" y="785794"/>
+            <a:ext cx="216382" cy="232136"/>
           </a:xfrm>
           <a:prstGeom prst="mathMultiply">
             <a:avLst/>
@@ -6727,7 +6906,50 @@
       </a:bgFillStyleLst>
     </a:fmtScheme>
   </a:themeElements>
-  <a:objectDefaults/>
+  <a:objectDefaults>
+    <a:spDef>
+      <a:spPr>
+        <a:solidFill>
+          <a:schemeClr val="accent1">
+            <a:lumMod val="20000"/>
+            <a:lumOff val="80000"/>
+          </a:schemeClr>
+        </a:solidFill>
+        <a:ln>
+          <a:solidFill>
+            <a:schemeClr val="accent5">
+              <a:lumMod val="60000"/>
+              <a:lumOff val="40000"/>
+            </a:schemeClr>
+          </a:solidFill>
+        </a:ln>
+      </a:spPr>
+      <a:bodyPr rtlCol="0" anchor="ctr"/>
+      <a:lstStyle>
+        <a:defPPr>
+          <a:defRPr sz="1400" dirty="0">
+            <a:solidFill>
+              <a:schemeClr val="tx1"/>
+            </a:solidFill>
+          </a:defRPr>
+        </a:defPPr>
+      </a:lstStyle>
+      <a:style>
+        <a:lnRef idx="2">
+          <a:schemeClr val="accent5"/>
+        </a:lnRef>
+        <a:fillRef idx="1">
+          <a:schemeClr val="lt1"/>
+        </a:fillRef>
+        <a:effectRef idx="0">
+          <a:schemeClr val="accent5"/>
+        </a:effectRef>
+        <a:fontRef idx="minor">
+          <a:schemeClr val="dk1"/>
+        </a:fontRef>
+      </a:style>
+    </a:spDef>
+  </a:objectDefaults>
   <a:extraClrSchemeLst/>
 </a:theme>
 </file>

</xml_diff>

<commit_message>
- As janelas do programa foram atualizadas; - O Manual do Usuário foi desenvolvido; - As figuras usadas no Manual do Usuário foram colocadas na pasta.
</commit_message>
<xml_diff>
--- a/Documentação/Manual do Usuário/janelas.pptx
+++ b/Documentação/Manual do Usuário/janelas.pptx
@@ -3578,16 +3578,16 @@
       </p:grpSpPr>
       <p:grpSp>
         <p:nvGrpSpPr>
-          <p:cNvPr id="36" name="Grupo 35"/>
+          <p:cNvPr id="34" name="Grupo 33"/>
           <p:cNvGrpSpPr/>
           <p:nvPr/>
         </p:nvGrpSpPr>
         <p:grpSpPr>
           <a:xfrm>
-            <a:off x="285720" y="818595"/>
-            <a:ext cx="8501121" cy="5067369"/>
-            <a:chOff x="285720" y="818595"/>
-            <a:chExt cx="8501121" cy="5067369"/>
+            <a:off x="1000100" y="785794"/>
+            <a:ext cx="6749577" cy="5067369"/>
+            <a:chOff x="357158" y="785794"/>
+            <a:chExt cx="6749577" cy="5067369"/>
           </a:xfrm>
         </p:grpSpPr>
         <p:grpSp>
@@ -3598,7 +3598,7 @@
           </p:nvGrpSpPr>
           <p:grpSpPr>
             <a:xfrm>
-              <a:off x="285720" y="818595"/>
+              <a:off x="357158" y="785794"/>
               <a:ext cx="6500858" cy="5067369"/>
               <a:chOff x="714348" y="739939"/>
               <a:chExt cx="7715304" cy="6014021"/>
@@ -3788,6 +3788,11 @@
                   <a:prstGeom prst="rect">
                     <a:avLst/>
                   </a:prstGeom>
+                  <a:solidFill>
+                    <a:schemeClr val="bg1">
+                      <a:lumMod val="95000"/>
+                    </a:schemeClr>
+                  </a:solidFill>
                   <a:ln>
                     <a:solidFill>
                       <a:schemeClr val="accent5">
@@ -3816,10 +3821,6 @@
                   <a:lstStyle/>
                   <a:p>
                     <a:pPr algn="ctr"/>
-                    <a:r>
-                      <a:rPr lang="pt-BR" sz="1400" dirty="0" smtClean="0"/>
-                      <a:t>Região destinada ao desenho do mapa e exibição da simulação.</a:t>
-                    </a:r>
                     <a:endParaRPr lang="pt-BR" sz="1400" dirty="0"/>
                   </a:p>
                 </p:txBody>
@@ -3903,11 +3904,7 @@
                     </a:r>
                     <a:r>
                       <a:rPr lang="pt-BR" sz="1400" dirty="0" smtClean="0"/>
-                      <a:t> </a:t>
-                    </a:r>
-                    <a:r>
-                      <a:rPr lang="pt-BR" sz="1400" dirty="0" smtClean="0"/>
-                      <a:t>     </a:t>
+                      <a:t>      </a:t>
                     </a:r>
                     <a:r>
                       <a:rPr lang="pt-BR" sz="1400" u="sng" dirty="0" smtClean="0"/>
@@ -4218,7 +4215,7 @@
             <p:spPr>
               <a:xfrm>
                 <a:off x="8059583" y="805716"/>
-                <a:ext cx="285752" cy="285752"/>
+                <a:ext cx="285753" cy="285751"/>
               </a:xfrm>
               <a:prstGeom prst="mathMultiply">
                 <a:avLst/>
@@ -4268,7 +4265,7 @@
             </p:nvSpPr>
             <p:spPr>
               <a:xfrm>
-                <a:off x="7506794" y="1012987"/>
+                <a:off x="7506794" y="997702"/>
                 <a:ext cx="259994" cy="71438"/>
               </a:xfrm>
               <a:prstGeom prst="mathMinus">
@@ -4320,9 +4317,9 @@
             <p:grpSpPr>
               <a:xfrm>
                 <a:off x="7825347" y="851396"/>
-                <a:ext cx="201435" cy="201435"/>
+                <a:ext cx="201435" cy="201436"/>
                 <a:chOff x="7825347" y="851396"/>
-                <a:chExt cx="201435" cy="201435"/>
+                <a:chExt cx="201435" cy="201436"/>
               </a:xfrm>
             </p:grpSpPr>
             <p:sp>
@@ -4379,7 +4376,7 @@
               <p:spPr>
                 <a:xfrm>
                   <a:off x="7825347" y="909955"/>
-                  <a:ext cx="142876" cy="142876"/>
+                  <a:ext cx="142877" cy="142877"/>
                 </a:xfrm>
                 <a:prstGeom prst="rect">
                   <a:avLst/>
@@ -4425,7 +4422,7 @@
           </p:nvSpPr>
           <p:spPr>
             <a:xfrm>
-              <a:off x="6916574" y="1428736"/>
+              <a:off x="5236468" y="1344419"/>
               <a:ext cx="1870267" cy="668700"/>
             </a:xfrm>
             <a:prstGeom prst="leftArrow">
@@ -4468,6 +4465,64 @@
           </p:txBody>
         </p:sp>
       </p:grpSp>
+      <p:sp>
+        <p:nvSpPr>
+          <p:cNvPr id="29" name="Seta para a esquerda 28"/>
+          <p:cNvSpPr/>
+          <p:nvPr/>
+        </p:nvSpPr>
+        <p:spPr>
+          <a:xfrm>
+            <a:off x="5000628" y="3143248"/>
+            <a:ext cx="2753281" cy="668700"/>
+          </a:xfrm>
+          <a:prstGeom prst="leftArrow">
+            <a:avLst/>
+          </a:prstGeom>
+        </p:spPr>
+        <p:style>
+          <a:lnRef idx="1">
+            <a:schemeClr val="accent1"/>
+          </a:lnRef>
+          <a:fillRef idx="2">
+            <a:schemeClr val="accent1"/>
+          </a:fillRef>
+          <a:effectRef idx="1">
+            <a:schemeClr val="accent1"/>
+          </a:effectRef>
+          <a:fontRef idx="minor">
+            <a:schemeClr val="dk1"/>
+          </a:fontRef>
+        </p:style>
+        <p:txBody>
+          <a:bodyPr rtlCol="0" anchor="ctr"/>
+          <a:lstStyle/>
+          <a:p>
+            <a:pPr algn="ctr"/>
+            <a:r>
+              <a:rPr lang="pt-BR" sz="1400" dirty="0" smtClean="0">
+                <a:solidFill>
+                  <a:schemeClr val="tx1"/>
+                </a:solidFill>
+              </a:rPr>
+              <a:t>Área </a:t>
+            </a:r>
+            <a:r>
+              <a:rPr lang="pt-BR" sz="1400" dirty="0" smtClean="0">
+                <a:solidFill>
+                  <a:schemeClr val="tx1"/>
+                </a:solidFill>
+              </a:rPr>
+              <a:t>de Desenho e Simulação</a:t>
+            </a:r>
+            <a:endParaRPr lang="pt-BR" sz="1400" dirty="0">
+              <a:solidFill>
+                <a:schemeClr val="tx1"/>
+              </a:solidFill>
+            </a:endParaRPr>
+          </a:p>
+        </p:txBody>
+      </p:sp>
     </p:spTree>
   </p:cSld>
   <p:clrMapOvr>
@@ -4508,10 +4563,10 @@
         </p:nvGrpSpPr>
         <p:grpSpPr>
           <a:xfrm>
-            <a:off x="562655" y="3519153"/>
-            <a:ext cx="2492208" cy="2598918"/>
-            <a:chOff x="570748" y="2804775"/>
-            <a:chExt cx="2492208" cy="2598918"/>
+            <a:off x="571472" y="3519153"/>
+            <a:ext cx="2487599" cy="2598918"/>
+            <a:chOff x="579565" y="2804775"/>
+            <a:chExt cx="2487599" cy="2598918"/>
           </a:xfrm>
         </p:grpSpPr>
         <p:grpSp>
@@ -4522,10 +4577,10 @@
           </p:nvGrpSpPr>
           <p:grpSpPr>
             <a:xfrm>
-              <a:off x="570748" y="2804775"/>
-              <a:ext cx="2492208" cy="2598918"/>
-              <a:chOff x="641977" y="702291"/>
-              <a:chExt cx="3144206" cy="1711483"/>
+              <a:off x="579565" y="2804775"/>
+              <a:ext cx="2487599" cy="2598918"/>
+              <a:chOff x="653101" y="702291"/>
+              <a:chExt cx="3138391" cy="1711483"/>
             </a:xfrm>
           </p:grpSpPr>
           <p:grpSp>
@@ -4536,10 +4591,10 @@
             </p:nvGrpSpPr>
             <p:grpSpPr>
               <a:xfrm>
-                <a:off x="641977" y="702291"/>
-                <a:ext cx="3144206" cy="1711483"/>
-                <a:chOff x="641976" y="705047"/>
-                <a:chExt cx="3144206" cy="1791050"/>
+                <a:off x="653101" y="702291"/>
+                <a:ext cx="3138391" cy="1711483"/>
+                <a:chOff x="653100" y="705047"/>
+                <a:chExt cx="3138391" cy="1791050"/>
               </a:xfrm>
             </p:grpSpPr>
             <p:sp>
@@ -4550,8 +4605,8 @@
               </p:nvSpPr>
               <p:spPr>
                 <a:xfrm>
-                  <a:off x="642877" y="2348270"/>
-                  <a:ext cx="3132367" cy="147827"/>
+                  <a:off x="659125" y="2348270"/>
+                  <a:ext cx="3132366" cy="147827"/>
                 </a:xfrm>
                 <a:prstGeom prst="roundRect">
                   <a:avLst/>
@@ -4605,7 +4660,7 @@
               </p:nvSpPr>
               <p:spPr>
                 <a:xfrm>
-                  <a:off x="641976" y="705047"/>
+                  <a:off x="658224" y="705047"/>
                   <a:ext cx="3133081" cy="245614"/>
                 </a:xfrm>
                 <a:prstGeom prst="roundRect">
@@ -5116,10 +5171,10 @@
         </p:nvGrpSpPr>
         <p:grpSpPr>
           <a:xfrm>
-            <a:off x="4488543" y="656587"/>
-            <a:ext cx="2496019" cy="1681115"/>
-            <a:chOff x="558534" y="2799728"/>
-            <a:chExt cx="2500811" cy="1681115"/>
+            <a:off x="4509535" y="656587"/>
+            <a:ext cx="2488766" cy="1700844"/>
+            <a:chOff x="579567" y="2799728"/>
+            <a:chExt cx="2493543" cy="1700844"/>
           </a:xfrm>
         </p:grpSpPr>
         <p:grpSp>
@@ -5130,10 +5185,10 @@
           </p:nvGrpSpPr>
           <p:grpSpPr>
             <a:xfrm>
-              <a:off x="558534" y="2799728"/>
-              <a:ext cx="2500811" cy="1681115"/>
-              <a:chOff x="626565" y="698967"/>
-              <a:chExt cx="3155061" cy="1107076"/>
+              <a:off x="579567" y="2799728"/>
+              <a:ext cx="2493543" cy="1700844"/>
+              <a:chOff x="653101" y="698967"/>
+              <a:chExt cx="3145891" cy="1120068"/>
             </a:xfrm>
           </p:grpSpPr>
           <p:grpSp>
@@ -5144,10 +5199,10 @@
             </p:nvGrpSpPr>
             <p:grpSpPr>
               <a:xfrm>
-                <a:off x="626565" y="698967"/>
-                <a:ext cx="3155061" cy="1107076"/>
-                <a:chOff x="626564" y="701569"/>
-                <a:chExt cx="3155061" cy="1158542"/>
+                <a:off x="653101" y="698967"/>
+                <a:ext cx="3145891" cy="1120068"/>
+                <a:chOff x="653100" y="701569"/>
+                <a:chExt cx="3145891" cy="1172138"/>
               </a:xfrm>
             </p:grpSpPr>
             <p:sp>
@@ -5158,8 +5213,8 @@
               </p:nvSpPr>
               <p:spPr>
                 <a:xfrm>
-                  <a:off x="626564" y="1712284"/>
-                  <a:ext cx="3144419" cy="147827"/>
+                  <a:off x="659124" y="1712284"/>
+                  <a:ext cx="3139867" cy="161423"/>
                 </a:xfrm>
                 <a:prstGeom prst="roundRect">
                   <a:avLst/>
@@ -5213,7 +5268,7 @@
               </p:nvSpPr>
               <p:spPr>
                 <a:xfrm>
-                  <a:off x="641756" y="701569"/>
+                  <a:off x="658036" y="701569"/>
                   <a:ext cx="3139869" cy="245613"/>
                 </a:xfrm>
                 <a:prstGeom prst="roundRect">
@@ -5280,7 +5335,7 @@
               </p:nvSpPr>
               <p:spPr>
                 <a:xfrm>
-                  <a:off x="636821" y="933077"/>
+                  <a:off x="653100" y="933077"/>
                   <a:ext cx="3139870" cy="891399"/>
                 </a:xfrm>
                 <a:prstGeom prst="rect">
@@ -5818,7 +5873,7 @@
             </p:nvSpPr>
             <p:spPr>
               <a:xfrm>
-                <a:off x="2236014" y="1039712"/>
+                <a:off x="2225074" y="1039712"/>
                 <a:ext cx="993305" cy="154548"/>
               </a:xfrm>
               <a:prstGeom prst="rect">
@@ -6625,6 +6680,13 @@
   <p:clrMapOvr>
     <a:masterClrMapping/>
   </p:clrMapOvr>
+  <p:timing>
+    <p:tnLst>
+      <p:par>
+        <p:cTn id="1" dur="indefinite" restart="never" nodeType="tmRoot"/>
+      </p:par>
+    </p:tnLst>
+  </p:timing>
 </p:sld>
 </file>
 

</xml_diff>

<commit_message>
- Criação do Manual do Usuário - 2ª versão: houve a inclusão de novas figuras, que também foram adicionadas à pasta, e de um exemplo de relatório.
</commit_message>
<xml_diff>
--- a/Documentação/Manual do Usuário/janelas.pptx
+++ b/Documentação/Manual do Usuário/janelas.pptx
@@ -5,11 +5,12 @@
     <p:sldMasterId id="2147483648" r:id="rId1"/>
   </p:sldMasterIdLst>
   <p:notesMasterIdLst>
-    <p:notesMasterId r:id="rId4"/>
+    <p:notesMasterId r:id="rId5"/>
   </p:notesMasterIdLst>
   <p:sldIdLst>
     <p:sldId id="256" r:id="rId2"/>
     <p:sldId id="257" r:id="rId3"/>
+    <p:sldId id="258" r:id="rId4"/>
   </p:sldIdLst>
   <p:sldSz cx="9144000" cy="6858000" type="screen4x3"/>
   <p:notesSz cx="6858000" cy="9144000"/>
@@ -194,7 +195,7 @@
             <a:fld id="{96B7E667-CCE7-4EBE-9BC2-3D4686A3281A}" type="datetimeFigureOut">
               <a:rPr lang="pt-BR" smtClean="0"/>
               <a:pPr/>
-              <a:t>19/05/2009</a:t>
+              <a:t>16/06/2009</a:t>
             </a:fld>
             <a:endParaRPr lang="pt-BR"/>
           </a:p>
@@ -624,6 +625,88 @@
 </p:notes>
 </file>
 
+<file path=ppt/notesSlides/notesSlide3.xml><?xml version="1.0" encoding="utf-8"?>
+<p:notes xmlns:a="http://schemas.openxmlformats.org/drawingml/2006/main" xmlns:r="http://schemas.openxmlformats.org/officeDocument/2006/relationships" xmlns:p="http://schemas.openxmlformats.org/presentationml/2006/main">
+  <p:cSld>
+    <p:spTree>
+      <p:nvGrpSpPr>
+        <p:cNvPr id="1" name=""/>
+        <p:cNvGrpSpPr/>
+        <p:nvPr/>
+      </p:nvGrpSpPr>
+      <p:grpSpPr>
+        <a:xfrm>
+          <a:off x="0" y="0"/>
+          <a:ext cx="0" cy="0"/>
+          <a:chOff x="0" y="0"/>
+          <a:chExt cx="0" cy="0"/>
+        </a:xfrm>
+      </p:grpSpPr>
+      <p:sp>
+        <p:nvSpPr>
+          <p:cNvPr id="2" name="Espaço Reservado para Imagem de Slide 1"/>
+          <p:cNvSpPr>
+            <a:spLocks noGrp="1" noRot="1" noChangeAspect="1"/>
+          </p:cNvSpPr>
+          <p:nvPr>
+            <p:ph type="sldImg"/>
+          </p:nvPr>
+        </p:nvSpPr>
+        <p:spPr/>
+      </p:sp>
+      <p:sp>
+        <p:nvSpPr>
+          <p:cNvPr id="3" name="Espaço Reservado para Anotações 2"/>
+          <p:cNvSpPr>
+            <a:spLocks noGrp="1"/>
+          </p:cNvSpPr>
+          <p:nvPr>
+            <p:ph type="body" idx="1"/>
+          </p:nvPr>
+        </p:nvSpPr>
+        <p:spPr/>
+        <p:txBody>
+          <a:bodyPr>
+            <a:normAutofit/>
+          </a:bodyPr>
+          <a:lstStyle/>
+          <a:p>
+            <a:endParaRPr lang="pt-BR"/>
+          </a:p>
+        </p:txBody>
+      </p:sp>
+      <p:sp>
+        <p:nvSpPr>
+          <p:cNvPr id="4" name="Espaço Reservado para Número de Slide 3"/>
+          <p:cNvSpPr>
+            <a:spLocks noGrp="1"/>
+          </p:cNvSpPr>
+          <p:nvPr>
+            <p:ph type="sldNum" sz="quarter" idx="10"/>
+          </p:nvPr>
+        </p:nvSpPr>
+        <p:spPr/>
+        <p:txBody>
+          <a:bodyPr/>
+          <a:lstStyle/>
+          <a:p>
+            <a:fld id="{0B357942-8123-4276-B24C-D10FFA08FD83}" type="slidenum">
+              <a:rPr lang="pt-BR" smtClean="0"/>
+              <a:pPr/>
+              <a:t>3</a:t>
+            </a:fld>
+            <a:endParaRPr lang="pt-BR"/>
+          </a:p>
+        </p:txBody>
+      </p:sp>
+    </p:spTree>
+  </p:cSld>
+  <p:clrMapOvr>
+    <a:masterClrMapping/>
+  </p:clrMapOvr>
+</p:notes>
+</file>
+
 <file path=ppt/slideLayouts/slideLayout1.xml><?xml version="1.0" encoding="utf-8"?>
 <p:sldLayout xmlns:a="http://schemas.openxmlformats.org/drawingml/2006/main" xmlns:r="http://schemas.openxmlformats.org/officeDocument/2006/relationships" xmlns:p="http://schemas.openxmlformats.org/presentationml/2006/main" type="title" preserve="1">
   <p:cSld name="Slide de título">
@@ -806,7 +889,7 @@
             <a:fld id="{963319C4-A51E-4246-83F7-260429D40A10}" type="datetimeFigureOut">
               <a:rPr lang="pt-BR" smtClean="0"/>
               <a:pPr/>
-              <a:t>19/05/2009</a:t>
+              <a:t>16/06/2009</a:t>
             </a:fld>
             <a:endParaRPr lang="pt-BR"/>
           </a:p>
@@ -973,7 +1056,7 @@
             <a:fld id="{963319C4-A51E-4246-83F7-260429D40A10}" type="datetimeFigureOut">
               <a:rPr lang="pt-BR" smtClean="0"/>
               <a:pPr/>
-              <a:t>19/05/2009</a:t>
+              <a:t>16/06/2009</a:t>
             </a:fld>
             <a:endParaRPr lang="pt-BR"/>
           </a:p>
@@ -1150,7 +1233,7 @@
             <a:fld id="{963319C4-A51E-4246-83F7-260429D40A10}" type="datetimeFigureOut">
               <a:rPr lang="pt-BR" smtClean="0"/>
               <a:pPr/>
-              <a:t>19/05/2009</a:t>
+              <a:t>16/06/2009</a:t>
             </a:fld>
             <a:endParaRPr lang="pt-BR"/>
           </a:p>
@@ -1317,7 +1400,7 @@
             <a:fld id="{963319C4-A51E-4246-83F7-260429D40A10}" type="datetimeFigureOut">
               <a:rPr lang="pt-BR" smtClean="0"/>
               <a:pPr/>
-              <a:t>19/05/2009</a:t>
+              <a:t>16/06/2009</a:t>
             </a:fld>
             <a:endParaRPr lang="pt-BR"/>
           </a:p>
@@ -1560,7 +1643,7 @@
             <a:fld id="{963319C4-A51E-4246-83F7-260429D40A10}" type="datetimeFigureOut">
               <a:rPr lang="pt-BR" smtClean="0"/>
               <a:pPr/>
-              <a:t>19/05/2009</a:t>
+              <a:t>16/06/2009</a:t>
             </a:fld>
             <a:endParaRPr lang="pt-BR"/>
           </a:p>
@@ -1845,7 +1928,7 @@
             <a:fld id="{963319C4-A51E-4246-83F7-260429D40A10}" type="datetimeFigureOut">
               <a:rPr lang="pt-BR" smtClean="0"/>
               <a:pPr/>
-              <a:t>19/05/2009</a:t>
+              <a:t>16/06/2009</a:t>
             </a:fld>
             <a:endParaRPr lang="pt-BR"/>
           </a:p>
@@ -2264,7 +2347,7 @@
             <a:fld id="{963319C4-A51E-4246-83F7-260429D40A10}" type="datetimeFigureOut">
               <a:rPr lang="pt-BR" smtClean="0"/>
               <a:pPr/>
-              <a:t>19/05/2009</a:t>
+              <a:t>16/06/2009</a:t>
             </a:fld>
             <a:endParaRPr lang="pt-BR"/>
           </a:p>
@@ -2379,7 +2462,7 @@
             <a:fld id="{963319C4-A51E-4246-83F7-260429D40A10}" type="datetimeFigureOut">
               <a:rPr lang="pt-BR" smtClean="0"/>
               <a:pPr/>
-              <a:t>19/05/2009</a:t>
+              <a:t>16/06/2009</a:t>
             </a:fld>
             <a:endParaRPr lang="pt-BR"/>
           </a:p>
@@ -2471,7 +2554,7 @@
             <a:fld id="{963319C4-A51E-4246-83F7-260429D40A10}" type="datetimeFigureOut">
               <a:rPr lang="pt-BR" smtClean="0"/>
               <a:pPr/>
-              <a:t>19/05/2009</a:t>
+              <a:t>16/06/2009</a:t>
             </a:fld>
             <a:endParaRPr lang="pt-BR"/>
           </a:p>
@@ -2745,7 +2828,7 @@
             <a:fld id="{963319C4-A51E-4246-83F7-260429D40A10}" type="datetimeFigureOut">
               <a:rPr lang="pt-BR" smtClean="0"/>
               <a:pPr/>
-              <a:t>19/05/2009</a:t>
+              <a:t>16/06/2009</a:t>
             </a:fld>
             <a:endParaRPr lang="pt-BR"/>
           </a:p>
@@ -2995,7 +3078,7 @@
             <a:fld id="{963319C4-A51E-4246-83F7-260429D40A10}" type="datetimeFigureOut">
               <a:rPr lang="pt-BR" smtClean="0"/>
               <a:pPr/>
-              <a:t>19/05/2009</a:t>
+              <a:t>16/06/2009</a:t>
             </a:fld>
             <a:endParaRPr lang="pt-BR"/>
           </a:p>
@@ -3205,7 +3288,7 @@
             <a:fld id="{963319C4-A51E-4246-83F7-260429D40A10}" type="datetimeFigureOut">
               <a:rPr lang="pt-BR" smtClean="0"/>
               <a:pPr/>
-              <a:t>19/05/2009</a:t>
+              <a:t>16/06/2009</a:t>
             </a:fld>
             <a:endParaRPr lang="pt-BR"/>
           </a:p>
@@ -3974,7 +4057,7 @@
                 <p:nvPr/>
               </p:nvPicPr>
               <p:blipFill>
-                <a:blip r:embed="rId3"/>
+                <a:blip r:embed="rId3" cstate="print"/>
                 <a:stretch>
                   <a:fillRect/>
                 </a:stretch>
@@ -3998,7 +4081,7 @@
                 <p:nvPr/>
               </p:nvPicPr>
               <p:blipFill>
-                <a:blip r:embed="rId4"/>
+                <a:blip r:embed="rId4" cstate="print"/>
                 <a:stretch>
                   <a:fillRect/>
                 </a:stretch>
@@ -4022,7 +4105,7 @@
                 <p:nvPr/>
               </p:nvPicPr>
               <p:blipFill>
-                <a:blip r:embed="rId5"/>
+                <a:blip r:embed="rId5" cstate="print"/>
                 <a:stretch>
                   <a:fillRect/>
                 </a:stretch>
@@ -4046,7 +4129,7 @@
                 <p:nvPr/>
               </p:nvPicPr>
               <p:blipFill>
-                <a:blip r:embed="rId6"/>
+                <a:blip r:embed="rId6" cstate="print"/>
                 <a:stretch>
                   <a:fillRect/>
                 </a:stretch>
@@ -4070,7 +4153,7 @@
                 <p:nvPr/>
               </p:nvPicPr>
               <p:blipFill>
-                <a:blip r:embed="rId7"/>
+                <a:blip r:embed="rId7" cstate="print"/>
                 <a:stretch>
                   <a:fillRect/>
                 </a:stretch>
@@ -4094,7 +4177,7 @@
                 <p:nvPr/>
               </p:nvPicPr>
               <p:blipFill>
-                <a:blip r:embed="rId8"/>
+                <a:blip r:embed="rId8" cstate="print"/>
                 <a:stretch>
                   <a:fillRect/>
                 </a:stretch>
@@ -4118,7 +4201,7 @@
                 <p:nvPr/>
               </p:nvPicPr>
               <p:blipFill>
-                <a:blip r:embed="rId9"/>
+                <a:blip r:embed="rId9" cstate="print"/>
                 <a:stretch>
                   <a:fillRect/>
                 </a:stretch>
@@ -4142,7 +4225,7 @@
                 <p:nvPr/>
               </p:nvPicPr>
               <p:blipFill>
-                <a:blip r:embed="rId10"/>
+                <a:blip r:embed="rId10" cstate="print"/>
                 <a:stretch>
                   <a:fillRect/>
                 </a:stretch>
@@ -4166,7 +4249,7 @@
                 <p:nvPr/>
               </p:nvPicPr>
               <p:blipFill>
-                <a:blip r:embed="rId11"/>
+                <a:blip r:embed="rId11" cstate="print"/>
                 <a:stretch>
                   <a:fillRect/>
                 </a:stretch>
@@ -4190,7 +4273,7 @@
                 <p:nvPr/>
               </p:nvPicPr>
               <p:blipFill>
-                <a:blip r:embed="rId12"/>
+                <a:blip r:embed="rId12" cstate="print"/>
                 <a:stretch>
                   <a:fillRect/>
                 </a:stretch>
@@ -4505,15 +4588,7 @@
                   <a:schemeClr val="tx1"/>
                 </a:solidFill>
               </a:rPr>
-              <a:t>Área </a:t>
-            </a:r>
-            <a:r>
-              <a:rPr lang="pt-BR" sz="1400" dirty="0" smtClean="0">
-                <a:solidFill>
-                  <a:schemeClr val="tx1"/>
-                </a:solidFill>
-              </a:rPr>
-              <a:t>de Desenho e Simulação</a:t>
+              <a:t>Área de Desenho e Simulação</a:t>
             </a:r>
             <a:endParaRPr lang="pt-BR" sz="1400" dirty="0">
               <a:solidFill>
@@ -6690,6 +6765,177 @@
 </p:sld>
 </file>
 
+<file path=ppt/slides/slide3.xml><?xml version="1.0" encoding="utf-8"?>
+<p:sld xmlns:a="http://schemas.openxmlformats.org/drawingml/2006/main" xmlns:r="http://schemas.openxmlformats.org/officeDocument/2006/relationships" xmlns:p="http://schemas.openxmlformats.org/presentationml/2006/main">
+  <p:cSld>
+    <p:spTree>
+      <p:nvGrpSpPr>
+        <p:cNvPr id="1" name=""/>
+        <p:cNvGrpSpPr/>
+        <p:nvPr/>
+      </p:nvGrpSpPr>
+      <p:grpSpPr>
+        <a:xfrm>
+          <a:off x="0" y="0"/>
+          <a:ext cx="0" cy="0"/>
+          <a:chOff x="0" y="0"/>
+          <a:chExt cx="0" cy="0"/>
+        </a:xfrm>
+      </p:grpSpPr>
+      <p:grpSp>
+        <p:nvGrpSpPr>
+          <p:cNvPr id="10" name="Grupo 9"/>
+          <p:cNvGrpSpPr/>
+          <p:nvPr/>
+        </p:nvGrpSpPr>
+        <p:grpSpPr>
+          <a:xfrm>
+            <a:off x="1159377" y="1428736"/>
+            <a:ext cx="6825247" cy="3781953"/>
+            <a:chOff x="571472" y="1428736"/>
+            <a:chExt cx="6825247" cy="3781953"/>
+          </a:xfrm>
+        </p:grpSpPr>
+        <p:pic>
+          <p:nvPicPr>
+            <p:cNvPr id="9" name="Imagem 8" descr="tela_principal2.png"/>
+            <p:cNvPicPr>
+              <a:picLocks noChangeAspect="1"/>
+            </p:cNvPicPr>
+            <p:nvPr/>
+          </p:nvPicPr>
+          <p:blipFill>
+            <a:blip r:embed="rId3" cstate="print"/>
+            <a:stretch>
+              <a:fillRect/>
+            </a:stretch>
+          </p:blipFill>
+          <p:spPr>
+            <a:xfrm>
+              <a:off x="571472" y="1428736"/>
+              <a:ext cx="6716063" cy="3781953"/>
+            </a:xfrm>
+            <a:prstGeom prst="rect">
+              <a:avLst/>
+            </a:prstGeom>
+          </p:spPr>
+        </p:pic>
+        <p:sp>
+          <p:nvSpPr>
+            <p:cNvPr id="6" name="Seta para a esquerda 5"/>
+            <p:cNvSpPr/>
+            <p:nvPr/>
+          </p:nvSpPr>
+          <p:spPr>
+            <a:xfrm>
+              <a:off x="5526452" y="1643050"/>
+              <a:ext cx="1870267" cy="668700"/>
+            </a:xfrm>
+            <a:prstGeom prst="leftArrow">
+              <a:avLst/>
+            </a:prstGeom>
+          </p:spPr>
+          <p:style>
+            <a:lnRef idx="1">
+              <a:schemeClr val="accent1"/>
+            </a:lnRef>
+            <a:fillRef idx="2">
+              <a:schemeClr val="accent1"/>
+            </a:fillRef>
+            <a:effectRef idx="1">
+              <a:schemeClr val="accent1"/>
+            </a:effectRef>
+            <a:fontRef idx="minor">
+              <a:schemeClr val="dk1"/>
+            </a:fontRef>
+          </p:style>
+          <p:txBody>
+            <a:bodyPr rtlCol="0" anchor="ctr"/>
+            <a:lstStyle/>
+            <a:p>
+              <a:pPr algn="ctr"/>
+              <a:r>
+                <a:rPr lang="pt-BR" sz="1400" dirty="0" smtClean="0">
+                  <a:solidFill>
+                    <a:schemeClr val="tx1"/>
+                  </a:solidFill>
+                </a:rPr>
+                <a:t>Área de Comandos</a:t>
+              </a:r>
+              <a:endParaRPr lang="pt-BR" sz="1400" dirty="0">
+                <a:solidFill>
+                  <a:schemeClr val="tx1"/>
+                </a:solidFill>
+              </a:endParaRPr>
+            </a:p>
+          </p:txBody>
+        </p:sp>
+        <p:sp>
+          <p:nvSpPr>
+            <p:cNvPr id="7" name="Seta para a esquerda 6"/>
+            <p:cNvSpPr/>
+            <p:nvPr/>
+          </p:nvSpPr>
+          <p:spPr>
+            <a:xfrm>
+              <a:off x="4643438" y="3831870"/>
+              <a:ext cx="2753281" cy="668700"/>
+            </a:xfrm>
+            <a:prstGeom prst="leftArrow">
+              <a:avLst/>
+            </a:prstGeom>
+          </p:spPr>
+          <p:style>
+            <a:lnRef idx="1">
+              <a:schemeClr val="accent1"/>
+            </a:lnRef>
+            <a:fillRef idx="2">
+              <a:schemeClr val="accent1"/>
+            </a:fillRef>
+            <a:effectRef idx="1">
+              <a:schemeClr val="accent1"/>
+            </a:effectRef>
+            <a:fontRef idx="minor">
+              <a:schemeClr val="dk1"/>
+            </a:fontRef>
+          </p:style>
+          <p:txBody>
+            <a:bodyPr rtlCol="0" anchor="ctr"/>
+            <a:lstStyle/>
+            <a:p>
+              <a:pPr algn="ctr"/>
+              <a:r>
+                <a:rPr lang="pt-BR" sz="1400" dirty="0" smtClean="0">
+                  <a:solidFill>
+                    <a:schemeClr val="tx1"/>
+                  </a:solidFill>
+                </a:rPr>
+                <a:t>Área de Desenho e Simulação</a:t>
+              </a:r>
+              <a:endParaRPr lang="pt-BR" sz="1400" dirty="0">
+                <a:solidFill>
+                  <a:schemeClr val="tx1"/>
+                </a:solidFill>
+              </a:endParaRPr>
+            </a:p>
+          </p:txBody>
+        </p:sp>
+      </p:grpSp>
+    </p:spTree>
+  </p:cSld>
+  <p:clrMapOvr>
+    <a:masterClrMapping/>
+  </p:clrMapOvr>
+  <p:timing>
+    <p:tnLst>
+      <p:par>
+        <p:cTn id="1" dur="indefinite" restart="never" nodeType="tmRoot"/>
+      </p:par>
+    </p:tnLst>
+  </p:timing>
+</p:sld>
+</file>
+
 <file path=ppt/theme/theme1.xml><?xml version="1.0" encoding="utf-8"?>
 <a:theme xmlns:a="http://schemas.openxmlformats.org/drawingml/2006/main" name="Tema do Office">
   <a:themeElements>

</xml_diff>